<commit_message>
updated heart disease ppt
</commit_message>
<xml_diff>
--- a/Heart_Disease_Detection_Recreated.pptx
+++ b/Heart_Disease_Detection_Recreated.pptx
@@ -5,14 +5,17 @@
     <p:sldMasterId id="2147483648" r:id="rId1"/>
   </p:sldMasterIdLst>
   <p:sldIdLst>
-    <p:sldId id="256" r:id="rId7"/>
-    <p:sldId id="257" r:id="rId8"/>
-    <p:sldId id="258" r:id="rId9"/>
-    <p:sldId id="259" r:id="rId10"/>
-    <p:sldId id="260" r:id="rId11"/>
-    <p:sldId id="261" r:id="rId12"/>
-    <p:sldId id="262" r:id="rId13"/>
-    <p:sldId id="263" r:id="rId14"/>
+    <p:sldId id="256" r:id="rId2"/>
+    <p:sldId id="257" r:id="rId3"/>
+    <p:sldId id="258" r:id="rId4"/>
+    <p:sldId id="259" r:id="rId5"/>
+    <p:sldId id="264" r:id="rId6"/>
+    <p:sldId id="265" r:id="rId7"/>
+    <p:sldId id="260" r:id="rId8"/>
+    <p:sldId id="261" r:id="rId9"/>
+    <p:sldId id="266" r:id="rId10"/>
+    <p:sldId id="262" r:id="rId11"/>
+    <p:sldId id="263" r:id="rId12"/>
   </p:sldIdLst>
   <p:sldSz cx="9144000" cy="6858000" type="screen4x3"/>
   <p:notesSz cx="6858000" cy="9144000"/>
@@ -111,6 +114,22 @@
       </a:defRPr>
     </a:lvl9pPr>
   </p:defaultTextStyle>
+  <p:extLst>
+    <p:ext uri="{EFAFB233-063F-42B5-8137-9DF3F51BA10A}">
+      <p15:sldGuideLst xmlns:p15="http://schemas.microsoft.com/office/powerpoint/2012/main">
+        <p15:guide id="1" orient="horz" pos="2160">
+          <p15:clr>
+            <a:srgbClr val="A4A3A4"/>
+          </p15:clr>
+        </p15:guide>
+        <p15:guide id="2" pos="2880">
+          <p15:clr>
+            <a:srgbClr val="A4A3A4"/>
+          </p15:clr>
+        </p15:guide>
+      </p15:sldGuideLst>
+    </p:ext>
+  </p:extLst>
 </p:presentation>
 </file>
 
@@ -152,10 +171,9 @@
           <a:lstStyle/>
           <a:p>
             <a:r>
-              <a:rPr lang="en-US" smtClean="0"/>
+              <a:rPr lang="en-US"/>
               <a:t>Click to edit Master title style</a:t>
             </a:r>
-            <a:endParaRPr lang="en-US"/>
           </a:p>
         </p:txBody>
       </p:sp>
@@ -271,10 +289,9 @@
           </a:lstStyle>
           <a:p>
             <a:r>
-              <a:rPr lang="en-US" smtClean="0"/>
+              <a:rPr lang="en-US"/>
               <a:t>Click to edit Master subtitle style</a:t>
             </a:r>
-            <a:endParaRPr lang="en-US"/>
           </a:p>
         </p:txBody>
       </p:sp>
@@ -295,7 +312,7 @@
           <a:p>
             <a:fld id="{5BCAD085-E8A6-8845-BD4E-CB4CCA059FC4}" type="datetimeFigureOut">
               <a:rPr lang="en-US" smtClean="0"/>
-              <a:t>1/27/13</a:t>
+              <a:t>7/20/2025</a:t>
             </a:fld>
             <a:endParaRPr lang="en-US"/>
           </a:p>
@@ -353,6 +370,18 @@
   <p:clrMapOvr>
     <a:masterClrMapping/>
   </p:clrMapOvr>
+  <mc:AlternateContent xmlns:mc="http://schemas.openxmlformats.org/markup-compatibility/2006">
+    <mc:Choice xmlns:p14="http://schemas.microsoft.com/office/powerpoint/2010/main" Requires="p14">
+      <p:transition spd="med" p14:dur="700">
+        <p:fade/>
+      </p:transition>
+    </mc:Choice>
+    <mc:Fallback>
+      <p:transition spd="med">
+        <p:fade/>
+      </p:transition>
+    </mc:Fallback>
+  </mc:AlternateContent>
 </p:sldLayout>
 </file>
 
@@ -389,10 +418,9 @@
           <a:lstStyle/>
           <a:p>
             <a:r>
-              <a:rPr lang="en-US" smtClean="0"/>
+              <a:rPr lang="en-US"/>
               <a:t>Click to edit Master title style</a:t>
             </a:r>
-            <a:endParaRPr lang="en-US"/>
           </a:p>
         </p:txBody>
       </p:sp>
@@ -413,38 +441,37 @@
           <a:p>
             <a:pPr lvl="0"/>
             <a:r>
-              <a:rPr lang="en-US" smtClean="0"/>
+              <a:rPr lang="en-US"/>
               <a:t>Click to edit Master text styles</a:t>
             </a:r>
           </a:p>
           <a:p>
             <a:pPr lvl="1"/>
             <a:r>
-              <a:rPr lang="en-US" smtClean="0"/>
+              <a:rPr lang="en-US"/>
               <a:t>Second level</a:t>
             </a:r>
           </a:p>
           <a:p>
             <a:pPr lvl="2"/>
             <a:r>
-              <a:rPr lang="en-US" smtClean="0"/>
+              <a:rPr lang="en-US"/>
               <a:t>Third level</a:t>
             </a:r>
           </a:p>
           <a:p>
             <a:pPr lvl="3"/>
             <a:r>
-              <a:rPr lang="en-US" smtClean="0"/>
+              <a:rPr lang="en-US"/>
               <a:t>Fourth level</a:t>
             </a:r>
           </a:p>
           <a:p>
             <a:pPr lvl="4"/>
             <a:r>
-              <a:rPr lang="en-US" smtClean="0"/>
+              <a:rPr lang="en-US"/>
               <a:t>Fifth level</a:t>
             </a:r>
-            <a:endParaRPr lang="en-US"/>
           </a:p>
         </p:txBody>
       </p:sp>
@@ -465,7 +492,7 @@
           <a:p>
             <a:fld id="{5BCAD085-E8A6-8845-BD4E-CB4CCA059FC4}" type="datetimeFigureOut">
               <a:rPr lang="en-US" smtClean="0"/>
-              <a:t>1/27/13</a:t>
+              <a:t>7/20/2025</a:t>
             </a:fld>
             <a:endParaRPr lang="en-US"/>
           </a:p>
@@ -523,6 +550,18 @@
   <p:clrMapOvr>
     <a:masterClrMapping/>
   </p:clrMapOvr>
+  <mc:AlternateContent xmlns:mc="http://schemas.openxmlformats.org/markup-compatibility/2006">
+    <mc:Choice xmlns:p14="http://schemas.microsoft.com/office/powerpoint/2010/main" Requires="p14">
+      <p:transition spd="med" p14:dur="700">
+        <p:fade/>
+      </p:transition>
+    </mc:Choice>
+    <mc:Fallback>
+      <p:transition spd="med">
+        <p:fade/>
+      </p:transition>
+    </mc:Fallback>
+  </mc:AlternateContent>
 </p:sldLayout>
 </file>
 
@@ -564,10 +603,9 @@
           <a:lstStyle/>
           <a:p>
             <a:r>
-              <a:rPr lang="en-US" smtClean="0"/>
+              <a:rPr lang="en-US"/>
               <a:t>Click to edit Master title style</a:t>
             </a:r>
-            <a:endParaRPr lang="en-US"/>
           </a:p>
         </p:txBody>
       </p:sp>
@@ -593,38 +631,37 @@
           <a:p>
             <a:pPr lvl="0"/>
             <a:r>
-              <a:rPr lang="en-US" smtClean="0"/>
+              <a:rPr lang="en-US"/>
               <a:t>Click to edit Master text styles</a:t>
             </a:r>
           </a:p>
           <a:p>
             <a:pPr lvl="1"/>
             <a:r>
-              <a:rPr lang="en-US" smtClean="0"/>
+              <a:rPr lang="en-US"/>
               <a:t>Second level</a:t>
             </a:r>
           </a:p>
           <a:p>
             <a:pPr lvl="2"/>
             <a:r>
-              <a:rPr lang="en-US" smtClean="0"/>
+              <a:rPr lang="en-US"/>
               <a:t>Third level</a:t>
             </a:r>
           </a:p>
           <a:p>
             <a:pPr lvl="3"/>
             <a:r>
-              <a:rPr lang="en-US" smtClean="0"/>
+              <a:rPr lang="en-US"/>
               <a:t>Fourth level</a:t>
             </a:r>
           </a:p>
           <a:p>
             <a:pPr lvl="4"/>
             <a:r>
-              <a:rPr lang="en-US" smtClean="0"/>
+              <a:rPr lang="en-US"/>
               <a:t>Fifth level</a:t>
             </a:r>
-            <a:endParaRPr lang="en-US"/>
           </a:p>
         </p:txBody>
       </p:sp>
@@ -645,7 +682,7 @@
           <a:p>
             <a:fld id="{5BCAD085-E8A6-8845-BD4E-CB4CCA059FC4}" type="datetimeFigureOut">
               <a:rPr lang="en-US" smtClean="0"/>
-              <a:t>1/27/13</a:t>
+              <a:t>7/20/2025</a:t>
             </a:fld>
             <a:endParaRPr lang="en-US"/>
           </a:p>
@@ -703,6 +740,18 @@
   <p:clrMapOvr>
     <a:masterClrMapping/>
   </p:clrMapOvr>
+  <mc:AlternateContent xmlns:mc="http://schemas.openxmlformats.org/markup-compatibility/2006">
+    <mc:Choice xmlns:p14="http://schemas.microsoft.com/office/powerpoint/2010/main" Requires="p14">
+      <p:transition spd="med" p14:dur="700">
+        <p:fade/>
+      </p:transition>
+    </mc:Choice>
+    <mc:Fallback>
+      <p:transition spd="med">
+        <p:fade/>
+      </p:transition>
+    </mc:Fallback>
+  </mc:AlternateContent>
 </p:sldLayout>
 </file>
 
@@ -739,10 +788,9 @@
           <a:lstStyle/>
           <a:p>
             <a:r>
-              <a:rPr lang="en-US" smtClean="0"/>
+              <a:rPr lang="en-US"/>
               <a:t>Click to edit Master title style</a:t>
             </a:r>
-            <a:endParaRPr lang="en-US"/>
           </a:p>
         </p:txBody>
       </p:sp>
@@ -763,38 +811,37 @@
           <a:p>
             <a:pPr lvl="0"/>
             <a:r>
-              <a:rPr lang="en-US" smtClean="0"/>
+              <a:rPr lang="en-US"/>
               <a:t>Click to edit Master text styles</a:t>
             </a:r>
           </a:p>
           <a:p>
             <a:pPr lvl="1"/>
             <a:r>
-              <a:rPr lang="en-US" smtClean="0"/>
+              <a:rPr lang="en-US"/>
               <a:t>Second level</a:t>
             </a:r>
           </a:p>
           <a:p>
             <a:pPr lvl="2"/>
             <a:r>
-              <a:rPr lang="en-US" smtClean="0"/>
+              <a:rPr lang="en-US"/>
               <a:t>Third level</a:t>
             </a:r>
           </a:p>
           <a:p>
             <a:pPr lvl="3"/>
             <a:r>
-              <a:rPr lang="en-US" smtClean="0"/>
+              <a:rPr lang="en-US"/>
               <a:t>Fourth level</a:t>
             </a:r>
           </a:p>
           <a:p>
             <a:pPr lvl="4"/>
             <a:r>
-              <a:rPr lang="en-US" smtClean="0"/>
+              <a:rPr lang="en-US"/>
               <a:t>Fifth level</a:t>
             </a:r>
-            <a:endParaRPr lang="en-US"/>
           </a:p>
         </p:txBody>
       </p:sp>
@@ -815,7 +862,7 @@
           <a:p>
             <a:fld id="{5BCAD085-E8A6-8845-BD4E-CB4CCA059FC4}" type="datetimeFigureOut">
               <a:rPr lang="en-US" smtClean="0"/>
-              <a:t>1/27/13</a:t>
+              <a:t>7/20/2025</a:t>
             </a:fld>
             <a:endParaRPr lang="en-US"/>
           </a:p>
@@ -873,6 +920,18 @@
   <p:clrMapOvr>
     <a:masterClrMapping/>
   </p:clrMapOvr>
+  <mc:AlternateContent xmlns:mc="http://schemas.openxmlformats.org/markup-compatibility/2006">
+    <mc:Choice xmlns:p14="http://schemas.microsoft.com/office/powerpoint/2010/main" Requires="p14">
+      <p:transition spd="med" p14:dur="700">
+        <p:fade/>
+      </p:transition>
+    </mc:Choice>
+    <mc:Fallback>
+      <p:transition spd="med">
+        <p:fade/>
+      </p:transition>
+    </mc:Fallback>
+  </mc:AlternateContent>
 </p:sldLayout>
 </file>
 
@@ -918,10 +977,9 @@
           </a:lstStyle>
           <a:p>
             <a:r>
-              <a:rPr lang="en-US" smtClean="0"/>
+              <a:rPr lang="en-US"/>
               <a:t>Click to edit Master title style</a:t>
             </a:r>
-            <a:endParaRPr lang="en-US"/>
           </a:p>
         </p:txBody>
       </p:sp>
@@ -1038,7 +1096,7 @@
           <a:p>
             <a:pPr lvl="0"/>
             <a:r>
-              <a:rPr lang="en-US" smtClean="0"/>
+              <a:rPr lang="en-US"/>
               <a:t>Click to edit Master text styles</a:t>
             </a:r>
           </a:p>
@@ -1061,7 +1119,7 @@
           <a:p>
             <a:fld id="{5BCAD085-E8A6-8845-BD4E-CB4CCA059FC4}" type="datetimeFigureOut">
               <a:rPr lang="en-US" smtClean="0"/>
-              <a:t>1/27/13</a:t>
+              <a:t>7/20/2025</a:t>
             </a:fld>
             <a:endParaRPr lang="en-US"/>
           </a:p>
@@ -1119,6 +1177,18 @@
   <p:clrMapOvr>
     <a:masterClrMapping/>
   </p:clrMapOvr>
+  <mc:AlternateContent xmlns:mc="http://schemas.openxmlformats.org/markup-compatibility/2006">
+    <mc:Choice xmlns:p14="http://schemas.microsoft.com/office/powerpoint/2010/main" Requires="p14">
+      <p:transition spd="med" p14:dur="700">
+        <p:fade/>
+      </p:transition>
+    </mc:Choice>
+    <mc:Fallback>
+      <p:transition spd="med">
+        <p:fade/>
+      </p:transition>
+    </mc:Fallback>
+  </mc:AlternateContent>
 </p:sldLayout>
 </file>
 
@@ -1155,10 +1225,9 @@
           <a:lstStyle/>
           <a:p>
             <a:r>
-              <a:rPr lang="en-US" smtClean="0"/>
+              <a:rPr lang="en-US"/>
               <a:t>Click to edit Master title style</a:t>
             </a:r>
-            <a:endParaRPr lang="en-US"/>
           </a:p>
         </p:txBody>
       </p:sp>
@@ -1212,38 +1281,37 @@
           <a:p>
             <a:pPr lvl="0"/>
             <a:r>
-              <a:rPr lang="en-US" smtClean="0"/>
+              <a:rPr lang="en-US"/>
               <a:t>Click to edit Master text styles</a:t>
             </a:r>
           </a:p>
           <a:p>
             <a:pPr lvl="1"/>
             <a:r>
-              <a:rPr lang="en-US" smtClean="0"/>
+              <a:rPr lang="en-US"/>
               <a:t>Second level</a:t>
             </a:r>
           </a:p>
           <a:p>
             <a:pPr lvl="2"/>
             <a:r>
-              <a:rPr lang="en-US" smtClean="0"/>
+              <a:rPr lang="en-US"/>
               <a:t>Third level</a:t>
             </a:r>
           </a:p>
           <a:p>
             <a:pPr lvl="3"/>
             <a:r>
-              <a:rPr lang="en-US" smtClean="0"/>
+              <a:rPr lang="en-US"/>
               <a:t>Fourth level</a:t>
             </a:r>
           </a:p>
           <a:p>
             <a:pPr lvl="4"/>
             <a:r>
-              <a:rPr lang="en-US" smtClean="0"/>
+              <a:rPr lang="en-US"/>
               <a:t>Fifth level</a:t>
             </a:r>
-            <a:endParaRPr lang="en-US"/>
           </a:p>
         </p:txBody>
       </p:sp>
@@ -1297,38 +1365,37 @@
           <a:p>
             <a:pPr lvl="0"/>
             <a:r>
-              <a:rPr lang="en-US" smtClean="0"/>
+              <a:rPr lang="en-US"/>
               <a:t>Click to edit Master text styles</a:t>
             </a:r>
           </a:p>
           <a:p>
             <a:pPr lvl="1"/>
             <a:r>
-              <a:rPr lang="en-US" smtClean="0"/>
+              <a:rPr lang="en-US"/>
               <a:t>Second level</a:t>
             </a:r>
           </a:p>
           <a:p>
             <a:pPr lvl="2"/>
             <a:r>
-              <a:rPr lang="en-US" smtClean="0"/>
+              <a:rPr lang="en-US"/>
               <a:t>Third level</a:t>
             </a:r>
           </a:p>
           <a:p>
             <a:pPr lvl="3"/>
             <a:r>
-              <a:rPr lang="en-US" smtClean="0"/>
+              <a:rPr lang="en-US"/>
               <a:t>Fourth level</a:t>
             </a:r>
           </a:p>
           <a:p>
             <a:pPr lvl="4"/>
             <a:r>
-              <a:rPr lang="en-US" smtClean="0"/>
+              <a:rPr lang="en-US"/>
               <a:t>Fifth level</a:t>
             </a:r>
-            <a:endParaRPr lang="en-US"/>
           </a:p>
         </p:txBody>
       </p:sp>
@@ -1349,7 +1416,7 @@
           <a:p>
             <a:fld id="{5BCAD085-E8A6-8845-BD4E-CB4CCA059FC4}" type="datetimeFigureOut">
               <a:rPr lang="en-US" smtClean="0"/>
-              <a:t>1/27/13</a:t>
+              <a:t>7/20/2025</a:t>
             </a:fld>
             <a:endParaRPr lang="en-US"/>
           </a:p>
@@ -1407,6 +1474,18 @@
   <p:clrMapOvr>
     <a:masterClrMapping/>
   </p:clrMapOvr>
+  <mc:AlternateContent xmlns:mc="http://schemas.openxmlformats.org/markup-compatibility/2006">
+    <mc:Choice xmlns:p14="http://schemas.microsoft.com/office/powerpoint/2010/main" Requires="p14">
+      <p:transition spd="med" p14:dur="700">
+        <p:fade/>
+      </p:transition>
+    </mc:Choice>
+    <mc:Fallback>
+      <p:transition spd="med">
+        <p:fade/>
+      </p:transition>
+    </mc:Fallback>
+  </mc:AlternateContent>
 </p:sldLayout>
 </file>
 
@@ -1447,10 +1526,9 @@
           </a:lstStyle>
           <a:p>
             <a:r>
-              <a:rPr lang="en-US" smtClean="0"/>
+              <a:rPr lang="en-US"/>
               <a:t>Click to edit Master title style</a:t>
             </a:r>
-            <a:endParaRPr lang="en-US"/>
           </a:p>
         </p:txBody>
       </p:sp>
@@ -1513,7 +1591,7 @@
           <a:p>
             <a:pPr lvl="0"/>
             <a:r>
-              <a:rPr lang="en-US" smtClean="0"/>
+              <a:rPr lang="en-US"/>
               <a:t>Click to edit Master text styles</a:t>
             </a:r>
           </a:p>
@@ -1569,38 +1647,37 @@
           <a:p>
             <a:pPr lvl="0"/>
             <a:r>
-              <a:rPr lang="en-US" smtClean="0"/>
+              <a:rPr lang="en-US"/>
               <a:t>Click to edit Master text styles</a:t>
             </a:r>
           </a:p>
           <a:p>
             <a:pPr lvl="1"/>
             <a:r>
-              <a:rPr lang="en-US" smtClean="0"/>
+              <a:rPr lang="en-US"/>
               <a:t>Second level</a:t>
             </a:r>
           </a:p>
           <a:p>
             <a:pPr lvl="2"/>
             <a:r>
-              <a:rPr lang="en-US" smtClean="0"/>
+              <a:rPr lang="en-US"/>
               <a:t>Third level</a:t>
             </a:r>
           </a:p>
           <a:p>
             <a:pPr lvl="3"/>
             <a:r>
-              <a:rPr lang="en-US" smtClean="0"/>
+              <a:rPr lang="en-US"/>
               <a:t>Fourth level</a:t>
             </a:r>
           </a:p>
           <a:p>
             <a:pPr lvl="4"/>
             <a:r>
-              <a:rPr lang="en-US" smtClean="0"/>
+              <a:rPr lang="en-US"/>
               <a:t>Fifth level</a:t>
             </a:r>
-            <a:endParaRPr lang="en-US"/>
           </a:p>
         </p:txBody>
       </p:sp>
@@ -1663,7 +1740,7 @@
           <a:p>
             <a:pPr lvl="0"/>
             <a:r>
-              <a:rPr lang="en-US" smtClean="0"/>
+              <a:rPr lang="en-US"/>
               <a:t>Click to edit Master text styles</a:t>
             </a:r>
           </a:p>
@@ -1719,38 +1796,37 @@
           <a:p>
             <a:pPr lvl="0"/>
             <a:r>
-              <a:rPr lang="en-US" smtClean="0"/>
+              <a:rPr lang="en-US"/>
               <a:t>Click to edit Master text styles</a:t>
             </a:r>
           </a:p>
           <a:p>
             <a:pPr lvl="1"/>
             <a:r>
-              <a:rPr lang="en-US" smtClean="0"/>
+              <a:rPr lang="en-US"/>
               <a:t>Second level</a:t>
             </a:r>
           </a:p>
           <a:p>
             <a:pPr lvl="2"/>
             <a:r>
-              <a:rPr lang="en-US" smtClean="0"/>
+              <a:rPr lang="en-US"/>
               <a:t>Third level</a:t>
             </a:r>
           </a:p>
           <a:p>
             <a:pPr lvl="3"/>
             <a:r>
-              <a:rPr lang="en-US" smtClean="0"/>
+              <a:rPr lang="en-US"/>
               <a:t>Fourth level</a:t>
             </a:r>
           </a:p>
           <a:p>
             <a:pPr lvl="4"/>
             <a:r>
-              <a:rPr lang="en-US" smtClean="0"/>
+              <a:rPr lang="en-US"/>
               <a:t>Fifth level</a:t>
             </a:r>
-            <a:endParaRPr lang="en-US"/>
           </a:p>
         </p:txBody>
       </p:sp>
@@ -1771,7 +1847,7 @@
           <a:p>
             <a:fld id="{5BCAD085-E8A6-8845-BD4E-CB4CCA059FC4}" type="datetimeFigureOut">
               <a:rPr lang="en-US" smtClean="0"/>
-              <a:t>1/27/13</a:t>
+              <a:t>7/20/2025</a:t>
             </a:fld>
             <a:endParaRPr lang="en-US"/>
           </a:p>
@@ -1829,6 +1905,18 @@
   <p:clrMapOvr>
     <a:masterClrMapping/>
   </p:clrMapOvr>
+  <mc:AlternateContent xmlns:mc="http://schemas.openxmlformats.org/markup-compatibility/2006">
+    <mc:Choice xmlns:p14="http://schemas.microsoft.com/office/powerpoint/2010/main" Requires="p14">
+      <p:transition spd="med" p14:dur="700">
+        <p:fade/>
+      </p:transition>
+    </mc:Choice>
+    <mc:Fallback>
+      <p:transition spd="med">
+        <p:fade/>
+      </p:transition>
+    </mc:Fallback>
+  </mc:AlternateContent>
 </p:sldLayout>
 </file>
 
@@ -1865,10 +1953,9 @@
           <a:lstStyle/>
           <a:p>
             <a:r>
-              <a:rPr lang="en-US" smtClean="0"/>
+              <a:rPr lang="en-US"/>
               <a:t>Click to edit Master title style</a:t>
             </a:r>
-            <a:endParaRPr lang="en-US"/>
           </a:p>
         </p:txBody>
       </p:sp>
@@ -1889,7 +1976,7 @@
           <a:p>
             <a:fld id="{5BCAD085-E8A6-8845-BD4E-CB4CCA059FC4}" type="datetimeFigureOut">
               <a:rPr lang="en-US" smtClean="0"/>
-              <a:t>1/27/13</a:t>
+              <a:t>7/20/2025</a:t>
             </a:fld>
             <a:endParaRPr lang="en-US"/>
           </a:p>
@@ -1947,6 +2034,18 @@
   <p:clrMapOvr>
     <a:masterClrMapping/>
   </p:clrMapOvr>
+  <mc:AlternateContent xmlns:mc="http://schemas.openxmlformats.org/markup-compatibility/2006">
+    <mc:Choice xmlns:p14="http://schemas.microsoft.com/office/powerpoint/2010/main" Requires="p14">
+      <p:transition spd="med" p14:dur="700">
+        <p:fade/>
+      </p:transition>
+    </mc:Choice>
+    <mc:Fallback>
+      <p:transition spd="med">
+        <p:fade/>
+      </p:transition>
+    </mc:Fallback>
+  </mc:AlternateContent>
 </p:sldLayout>
 </file>
 
@@ -1984,7 +2083,7 @@
           <a:p>
             <a:fld id="{5BCAD085-E8A6-8845-BD4E-CB4CCA059FC4}" type="datetimeFigureOut">
               <a:rPr lang="en-US" smtClean="0"/>
-              <a:t>1/27/13</a:t>
+              <a:t>7/20/2025</a:t>
             </a:fld>
             <a:endParaRPr lang="en-US"/>
           </a:p>
@@ -2042,6 +2141,18 @@
   <p:clrMapOvr>
     <a:masterClrMapping/>
   </p:clrMapOvr>
+  <mc:AlternateContent xmlns:mc="http://schemas.openxmlformats.org/markup-compatibility/2006">
+    <mc:Choice xmlns:p14="http://schemas.microsoft.com/office/powerpoint/2010/main" Requires="p14">
+      <p:transition spd="med" p14:dur="700">
+        <p:fade/>
+      </p:transition>
+    </mc:Choice>
+    <mc:Fallback>
+      <p:transition spd="med">
+        <p:fade/>
+      </p:transition>
+    </mc:Fallback>
+  </mc:AlternateContent>
 </p:sldLayout>
 </file>
 
@@ -2087,10 +2198,9 @@
           </a:lstStyle>
           <a:p>
             <a:r>
-              <a:rPr lang="en-US" smtClean="0"/>
+              <a:rPr lang="en-US"/>
               <a:t>Click to edit Master title style</a:t>
             </a:r>
-            <a:endParaRPr lang="en-US"/>
           </a:p>
         </p:txBody>
       </p:sp>
@@ -2144,38 +2254,37 @@
           <a:p>
             <a:pPr lvl="0"/>
             <a:r>
-              <a:rPr lang="en-US" smtClean="0"/>
+              <a:rPr lang="en-US"/>
               <a:t>Click to edit Master text styles</a:t>
             </a:r>
           </a:p>
           <a:p>
             <a:pPr lvl="1"/>
             <a:r>
-              <a:rPr lang="en-US" smtClean="0"/>
+              <a:rPr lang="en-US"/>
               <a:t>Second level</a:t>
             </a:r>
           </a:p>
           <a:p>
             <a:pPr lvl="2"/>
             <a:r>
-              <a:rPr lang="en-US" smtClean="0"/>
+              <a:rPr lang="en-US"/>
               <a:t>Third level</a:t>
             </a:r>
           </a:p>
           <a:p>
             <a:pPr lvl="3"/>
             <a:r>
-              <a:rPr lang="en-US" smtClean="0"/>
+              <a:rPr lang="en-US"/>
               <a:t>Fourth level</a:t>
             </a:r>
           </a:p>
           <a:p>
             <a:pPr lvl="4"/>
             <a:r>
-              <a:rPr lang="en-US" smtClean="0"/>
+              <a:rPr lang="en-US"/>
               <a:t>Fifth level</a:t>
             </a:r>
-            <a:endParaRPr lang="en-US"/>
           </a:p>
         </p:txBody>
       </p:sp>
@@ -2238,7 +2347,7 @@
           <a:p>
             <a:pPr lvl="0"/>
             <a:r>
-              <a:rPr lang="en-US" smtClean="0"/>
+              <a:rPr lang="en-US"/>
               <a:t>Click to edit Master text styles</a:t>
             </a:r>
           </a:p>
@@ -2261,7 +2370,7 @@
           <a:p>
             <a:fld id="{5BCAD085-E8A6-8845-BD4E-CB4CCA059FC4}" type="datetimeFigureOut">
               <a:rPr lang="en-US" smtClean="0"/>
-              <a:t>1/27/13</a:t>
+              <a:t>7/20/2025</a:t>
             </a:fld>
             <a:endParaRPr lang="en-US"/>
           </a:p>
@@ -2319,6 +2428,18 @@
   <p:clrMapOvr>
     <a:masterClrMapping/>
   </p:clrMapOvr>
+  <mc:AlternateContent xmlns:mc="http://schemas.openxmlformats.org/markup-compatibility/2006">
+    <mc:Choice xmlns:p14="http://schemas.microsoft.com/office/powerpoint/2010/main" Requires="p14">
+      <p:transition spd="med" p14:dur="700">
+        <p:fade/>
+      </p:transition>
+    </mc:Choice>
+    <mc:Fallback>
+      <p:transition spd="med">
+        <p:fade/>
+      </p:transition>
+    </mc:Fallback>
+  </mc:AlternateContent>
 </p:sldLayout>
 </file>
 
@@ -2364,10 +2485,9 @@
           </a:lstStyle>
           <a:p>
             <a:r>
-              <a:rPr lang="en-US" smtClean="0"/>
+              <a:rPr lang="en-US"/>
               <a:t>Click to edit Master title style</a:t>
             </a:r>
-            <a:endParaRPr lang="en-US"/>
           </a:p>
         </p:txBody>
       </p:sp>
@@ -2491,7 +2611,7 @@
           <a:p>
             <a:pPr lvl="0"/>
             <a:r>
-              <a:rPr lang="en-US" smtClean="0"/>
+              <a:rPr lang="en-US"/>
               <a:t>Click to edit Master text styles</a:t>
             </a:r>
           </a:p>
@@ -2514,7 +2634,7 @@
           <a:p>
             <a:fld id="{5BCAD085-E8A6-8845-BD4E-CB4CCA059FC4}" type="datetimeFigureOut">
               <a:rPr lang="en-US" smtClean="0"/>
-              <a:t>1/27/13</a:t>
+              <a:t>7/20/2025</a:t>
             </a:fld>
             <a:endParaRPr lang="en-US"/>
           </a:p>
@@ -2572,6 +2692,18 @@
   <p:clrMapOvr>
     <a:masterClrMapping/>
   </p:clrMapOvr>
+  <mc:AlternateContent xmlns:mc="http://schemas.openxmlformats.org/markup-compatibility/2006">
+    <mc:Choice xmlns:p14="http://schemas.microsoft.com/office/powerpoint/2010/main" Requires="p14">
+      <p:transition spd="med" p14:dur="700">
+        <p:fade/>
+      </p:transition>
+    </mc:Choice>
+    <mc:Fallback>
+      <p:transition spd="med">
+        <p:fade/>
+      </p:transition>
+    </mc:Fallback>
+  </mc:AlternateContent>
 </p:sldLayout>
 </file>
 
@@ -2623,10 +2755,9 @@
           <a:lstStyle/>
           <a:p>
             <a:r>
-              <a:rPr lang="en-US" smtClean="0"/>
+              <a:rPr lang="en-US"/>
               <a:t>Click to edit Master title style</a:t>
             </a:r>
-            <a:endParaRPr lang="en-US"/>
           </a:p>
         </p:txBody>
       </p:sp>
@@ -2657,38 +2788,37 @@
           <a:p>
             <a:pPr lvl="0"/>
             <a:r>
-              <a:rPr lang="en-US" smtClean="0"/>
+              <a:rPr lang="en-US"/>
               <a:t>Click to edit Master text styles</a:t>
             </a:r>
           </a:p>
           <a:p>
             <a:pPr lvl="1"/>
             <a:r>
-              <a:rPr lang="en-US" smtClean="0"/>
+              <a:rPr lang="en-US"/>
               <a:t>Second level</a:t>
             </a:r>
           </a:p>
           <a:p>
             <a:pPr lvl="2"/>
             <a:r>
-              <a:rPr lang="en-US" smtClean="0"/>
+              <a:rPr lang="en-US"/>
               <a:t>Third level</a:t>
             </a:r>
           </a:p>
           <a:p>
             <a:pPr lvl="3"/>
             <a:r>
-              <a:rPr lang="en-US" smtClean="0"/>
+              <a:rPr lang="en-US"/>
               <a:t>Fourth level</a:t>
             </a:r>
           </a:p>
           <a:p>
             <a:pPr lvl="4"/>
             <a:r>
-              <a:rPr lang="en-US" smtClean="0"/>
+              <a:rPr lang="en-US"/>
               <a:t>Fifth level</a:t>
             </a:r>
-            <a:endParaRPr lang="en-US"/>
           </a:p>
         </p:txBody>
       </p:sp>
@@ -2727,7 +2857,7 @@
           <a:p>
             <a:fld id="{5BCAD085-E8A6-8845-BD4E-CB4CCA059FC4}" type="datetimeFigureOut">
               <a:rPr lang="en-US" smtClean="0"/>
-              <a:t>1/27/13</a:t>
+              <a:t>7/20/2025</a:t>
             </a:fld>
             <a:endParaRPr lang="en-US"/>
           </a:p>
@@ -2832,6 +2962,18 @@
     <p:sldLayoutId id="2147483658" r:id="rId10"/>
     <p:sldLayoutId id="2147483659" r:id="rId11"/>
   </p:sldLayoutIdLst>
+  <mc:AlternateContent xmlns:mc="http://schemas.openxmlformats.org/markup-compatibility/2006">
+    <mc:Choice xmlns:p14="http://schemas.microsoft.com/office/powerpoint/2010/main" Requires="p14">
+      <p:transition spd="med" p14:dur="700">
+        <p:fade/>
+      </p:transition>
+    </mc:Choice>
+    <mc:Fallback>
+      <p:transition spd="med">
+        <p:fade/>
+      </p:transition>
+    </mc:Fallback>
+  </mc:AlternateContent>
   <p:txStyles>
     <p:titleStyle>
       <a:lvl1pPr algn="ctr" defTabSz="457200" rtl="0" eaLnBrk="1" latinLnBrk="0" hangingPunct="1">
@@ -3086,7 +3228,7 @@
 </file>
 
 <file path=ppt/slides/slide1.xml><?xml version="1.0" encoding="utf-8"?>
-<p:sld xmlns:a="http://schemas.openxmlformats.org/drawingml/2006/main" xmlns:p="http://schemas.openxmlformats.org/presentationml/2006/main" xmlns:r="http://schemas.openxmlformats.org/officeDocument/2006/relationships">
+<p:sld xmlns:a="http://schemas.openxmlformats.org/drawingml/2006/main" xmlns:r="http://schemas.openxmlformats.org/officeDocument/2006/relationships" xmlns:p="http://schemas.openxmlformats.org/presentationml/2006/main">
   <p:cSld>
     <p:spTree>
       <p:nvGrpSpPr>
@@ -3094,7 +3236,14 @@
         <p:cNvGrpSpPr/>
         <p:nvPr/>
       </p:nvGrpSpPr>
-      <p:grpSpPr/>
+      <p:grpSpPr>
+        <a:xfrm>
+          <a:off x="0" y="0"/>
+          <a:ext cx="0" cy="0"/>
+          <a:chOff x="0" y="0"/>
+          <a:chExt cx="0" cy="0"/>
+        </a:xfrm>
+      </p:grpSpPr>
       <p:sp>
         <p:nvSpPr>
           <p:cNvPr id="2" name="Title 1"/>
@@ -3107,10 +3256,13 @@
         </p:nvSpPr>
         <p:spPr/>
         <p:txBody>
-          <a:bodyPr/>
-          <a:lstStyle/>
-          <a:p>
-            <a:r>
+          <a:bodyPr>
+            <a:noAutofit/>
+          </a:bodyPr>
+          <a:lstStyle/>
+          <a:p>
+            <a:r>
+              <a:rPr sz="6600"/>
               <a:t>Heart Disease Detection</a:t>
             </a:r>
           </a:p>
@@ -3142,11 +3294,23 @@
   <p:clrMapOvr>
     <a:masterClrMapping/>
   </p:clrMapOvr>
+  <mc:AlternateContent xmlns:mc="http://schemas.openxmlformats.org/markup-compatibility/2006">
+    <mc:Choice xmlns:p14="http://schemas.microsoft.com/office/powerpoint/2010/main" Requires="p14">
+      <p:transition spd="med" p14:dur="700">
+        <p:fade/>
+      </p:transition>
+    </mc:Choice>
+    <mc:Fallback>
+      <p:transition spd="med">
+        <p:fade/>
+      </p:transition>
+    </mc:Fallback>
+  </mc:AlternateContent>
 </p:sld>
 </file>
 
-<file path=ppt/slides/slide2.xml><?xml version="1.0" encoding="utf-8"?>
-<p:sld xmlns:a="http://schemas.openxmlformats.org/drawingml/2006/main" xmlns:p="http://schemas.openxmlformats.org/presentationml/2006/main" xmlns:r="http://schemas.openxmlformats.org/officeDocument/2006/relationships">
+<file path=ppt/slides/slide10.xml><?xml version="1.0" encoding="utf-8"?>
+<p:sld xmlns:a="http://schemas.openxmlformats.org/drawingml/2006/main" xmlns:r="http://schemas.openxmlformats.org/officeDocument/2006/relationships" xmlns:p="http://schemas.openxmlformats.org/presentationml/2006/main">
   <p:cSld>
     <p:spTree>
       <p:nvGrpSpPr>
@@ -3154,7 +3318,14 @@
         <p:cNvGrpSpPr/>
         <p:nvPr/>
       </p:nvGrpSpPr>
-      <p:grpSpPr/>
+      <p:grpSpPr>
+        <a:xfrm>
+          <a:off x="0" y="0"/>
+          <a:ext cx="0" cy="0"/>
+          <a:chOff x="0" y="0"/>
+          <a:chExt cx="0" cy="0"/>
+        </a:xfrm>
+      </p:grpSpPr>
       <p:sp>
         <p:nvSpPr>
           <p:cNvPr id="2" name="Title 1"/>
@@ -3171,7 +3342,7 @@
           <a:lstStyle/>
           <a:p>
             <a:r>
-              <a:t>Problem Statement</a:t>
+              <a:t>Sample Prediction</a:t>
             </a:r>
           </a:p>
         </p:txBody>
@@ -3191,18 +3362,27 @@
           <a:bodyPr/>
           <a:lstStyle/>
           <a:p>
-            <a:r>
-              <a:t>• Heart disease is one of the leading causes of death globally.</a:t>
-            </a:r>
-          </a:p>
-          <a:p>
-            <a:r>
-              <a:t>• Early detection is critical to effective treatment.</a:t>
-            </a:r>
-          </a:p>
-          <a:p>
-            <a:r>
-              <a:t>• Build a machine learning model to predict heart disease based on clinical features.</a:t>
+            <a:pPr marL="0" indent="0">
+              <a:buNone/>
+            </a:pPr>
+            <a:r>
+              <a:t>• Input: New patient data with 11 features.</a:t>
+            </a:r>
+          </a:p>
+          <a:p>
+            <a:pPr marL="0" indent="0">
+              <a:buNone/>
+            </a:pPr>
+            <a:r>
+              <a:t>• Preprocessed using the same scaler.</a:t>
+            </a:r>
+          </a:p>
+          <a:p>
+            <a:pPr marL="0" indent="0">
+              <a:buNone/>
+            </a:pPr>
+            <a:r>
+              <a:t>• Model predicted: Heart Disease or Normal.</a:t>
             </a:r>
           </a:p>
         </p:txBody>
@@ -3212,11 +3392,23 @@
   <p:clrMapOvr>
     <a:masterClrMapping/>
   </p:clrMapOvr>
+  <mc:AlternateContent xmlns:mc="http://schemas.openxmlformats.org/markup-compatibility/2006">
+    <mc:Choice xmlns:p14="http://schemas.microsoft.com/office/powerpoint/2010/main" Requires="p14">
+      <p:transition spd="med" p14:dur="700">
+        <p:fade/>
+      </p:transition>
+    </mc:Choice>
+    <mc:Fallback>
+      <p:transition spd="med">
+        <p:fade/>
+      </p:transition>
+    </mc:Fallback>
+  </mc:AlternateContent>
 </p:sld>
 </file>
 
-<file path=ppt/slides/slide3.xml><?xml version="1.0" encoding="utf-8"?>
-<p:sld xmlns:a="http://schemas.openxmlformats.org/drawingml/2006/main" xmlns:p="http://schemas.openxmlformats.org/presentationml/2006/main" xmlns:r="http://schemas.openxmlformats.org/officeDocument/2006/relationships">
+<file path=ppt/slides/slide11.xml><?xml version="1.0" encoding="utf-8"?>
+<p:sld xmlns:a="http://schemas.openxmlformats.org/drawingml/2006/main" xmlns:r="http://schemas.openxmlformats.org/officeDocument/2006/relationships" xmlns:p="http://schemas.openxmlformats.org/presentationml/2006/main">
   <p:cSld>
     <p:spTree>
       <p:nvGrpSpPr>
@@ -3224,7 +3416,14 @@
         <p:cNvGrpSpPr/>
         <p:nvPr/>
       </p:nvGrpSpPr>
-      <p:grpSpPr/>
+      <p:grpSpPr>
+        <a:xfrm>
+          <a:off x="0" y="0"/>
+          <a:ext cx="0" cy="0"/>
+          <a:chOff x="0" y="0"/>
+          <a:chExt cx="0" cy="0"/>
+        </a:xfrm>
+      </p:grpSpPr>
       <p:sp>
         <p:nvSpPr>
           <p:cNvPr id="2" name="Title 1"/>
@@ -3241,7 +3440,7 @@
           <a:lstStyle/>
           <a:p>
             <a:r>
-              <a:t>Dataset Overview</a:t>
+              <a:t>Conclusion</a:t>
             </a:r>
           </a:p>
         </p:txBody>
@@ -3261,18 +3460,27 @@
           <a:bodyPr/>
           <a:lstStyle/>
           <a:p>
-            <a:r>
-              <a:t>• Contains 11 features and 1 target label.</a:t>
-            </a:r>
-          </a:p>
-          <a:p>
-            <a:r>
-              <a:t>• Features include age, sex, blood pressure, cholesterol, ECG, etc.</a:t>
-            </a:r>
-          </a:p>
-          <a:p>
-            <a:r>
-              <a:t>• Target: 1 = Heart Disease, 0 = No Disease.</a:t>
+            <a:pPr marL="0" indent="0">
+              <a:buNone/>
+            </a:pPr>
+            <a:r>
+              <a:t>• Built a robust model to assist in heart disease detection.</a:t>
+            </a:r>
+          </a:p>
+          <a:p>
+            <a:pPr marL="0" indent="0">
+              <a:buNone/>
+            </a:pPr>
+            <a:r>
+              <a:t>• Can be integrated into clinical decision systems.</a:t>
+            </a:r>
+          </a:p>
+          <a:p>
+            <a:pPr marL="0" indent="0">
+              <a:buNone/>
+            </a:pPr>
+            <a:r>
+              <a:t>• Scope for improvement: More data, ensemble models, real-time deployment.</a:t>
             </a:r>
           </a:p>
         </p:txBody>
@@ -3282,11 +3490,23 @@
   <p:clrMapOvr>
     <a:masterClrMapping/>
   </p:clrMapOvr>
+  <mc:AlternateContent xmlns:mc="http://schemas.openxmlformats.org/markup-compatibility/2006">
+    <mc:Choice xmlns:p14="http://schemas.microsoft.com/office/powerpoint/2010/main" Requires="p14">
+      <p:transition spd="med" p14:dur="700">
+        <p:fade/>
+      </p:transition>
+    </mc:Choice>
+    <mc:Fallback>
+      <p:transition spd="med">
+        <p:fade/>
+      </p:transition>
+    </mc:Fallback>
+  </mc:AlternateContent>
 </p:sld>
 </file>
 
-<file path=ppt/slides/slide4.xml><?xml version="1.0" encoding="utf-8"?>
-<p:sld xmlns:a="http://schemas.openxmlformats.org/drawingml/2006/main" xmlns:p="http://schemas.openxmlformats.org/presentationml/2006/main" xmlns:r="http://schemas.openxmlformats.org/officeDocument/2006/relationships">
+<file path=ppt/slides/slide2.xml><?xml version="1.0" encoding="utf-8"?>
+<p:sld xmlns:a="http://schemas.openxmlformats.org/drawingml/2006/main" xmlns:r="http://schemas.openxmlformats.org/officeDocument/2006/relationships" xmlns:p="http://schemas.openxmlformats.org/presentationml/2006/main">
   <p:cSld>
     <p:spTree>
       <p:nvGrpSpPr>
@@ -3294,7 +3514,14 @@
         <p:cNvGrpSpPr/>
         <p:nvPr/>
       </p:nvGrpSpPr>
-      <p:grpSpPr/>
+      <p:grpSpPr>
+        <a:xfrm>
+          <a:off x="0" y="0"/>
+          <a:ext cx="0" cy="0"/>
+          <a:chOff x="0" y="0"/>
+          <a:chExt cx="0" cy="0"/>
+        </a:xfrm>
+      </p:grpSpPr>
       <p:sp>
         <p:nvSpPr>
           <p:cNvPr id="2" name="Title 1"/>
@@ -3311,7 +3538,7 @@
           <a:lstStyle/>
           <a:p>
             <a:r>
-              <a:t>Data Preprocessing</a:t>
+              <a:t>Problem Statement</a:t>
             </a:r>
           </a:p>
         </p:txBody>
@@ -3331,23 +3558,27 @@
           <a:bodyPr/>
           <a:lstStyle/>
           <a:p>
-            <a:r>
-              <a:t>• Checked and confirmed no missing values.</a:t>
-            </a:r>
-          </a:p>
-          <a:p>
-            <a:r>
-              <a:t>• Separated features (X) and target (y).</a:t>
-            </a:r>
-          </a:p>
-          <a:p>
-            <a:r>
-              <a:t>• Scaled data using StandardScaler.</a:t>
-            </a:r>
-          </a:p>
-          <a:p>
-            <a:r>
-              <a:t>• Split into train-test sets (80%-20%).</a:t>
+            <a:pPr marL="0" indent="0">
+              <a:buNone/>
+            </a:pPr>
+            <a:r>
+              <a:t>• Heart disease is one of the leading causes of death globally.</a:t>
+            </a:r>
+          </a:p>
+          <a:p>
+            <a:pPr marL="0" indent="0">
+              <a:buNone/>
+            </a:pPr>
+            <a:r>
+              <a:t>• Early detection is critical to effective treatment.</a:t>
+            </a:r>
+          </a:p>
+          <a:p>
+            <a:pPr marL="0" indent="0">
+              <a:buNone/>
+            </a:pPr>
+            <a:r>
+              <a:t>• Build a machine learning model to predict heart disease based on clinical features.</a:t>
             </a:r>
           </a:p>
         </p:txBody>
@@ -3357,11 +3588,23 @@
   <p:clrMapOvr>
     <a:masterClrMapping/>
   </p:clrMapOvr>
+  <mc:AlternateContent xmlns:mc="http://schemas.openxmlformats.org/markup-compatibility/2006">
+    <mc:Choice xmlns:p14="http://schemas.microsoft.com/office/powerpoint/2010/main" Requires="p14">
+      <p:transition spd="med" p14:dur="700">
+        <p:fade/>
+      </p:transition>
+    </mc:Choice>
+    <mc:Fallback>
+      <p:transition spd="med">
+        <p:fade/>
+      </p:transition>
+    </mc:Fallback>
+  </mc:AlternateContent>
 </p:sld>
 </file>
 
-<file path=ppt/slides/slide5.xml><?xml version="1.0" encoding="utf-8"?>
-<p:sld xmlns:a="http://schemas.openxmlformats.org/drawingml/2006/main" xmlns:p="http://schemas.openxmlformats.org/presentationml/2006/main" xmlns:r="http://schemas.openxmlformats.org/officeDocument/2006/relationships">
+<file path=ppt/slides/slide3.xml><?xml version="1.0" encoding="utf-8"?>
+<p:sld xmlns:a="http://schemas.openxmlformats.org/drawingml/2006/main" xmlns:r="http://schemas.openxmlformats.org/officeDocument/2006/relationships" xmlns:p="http://schemas.openxmlformats.org/presentationml/2006/main">
   <p:cSld>
     <p:spTree>
       <p:nvGrpSpPr>
@@ -3369,7 +3612,14 @@
         <p:cNvGrpSpPr/>
         <p:nvPr/>
       </p:nvGrpSpPr>
-      <p:grpSpPr/>
+      <p:grpSpPr>
+        <a:xfrm>
+          <a:off x="0" y="0"/>
+          <a:ext cx="0" cy="0"/>
+          <a:chOff x="0" y="0"/>
+          <a:chExt cx="0" cy="0"/>
+        </a:xfrm>
+      </p:grpSpPr>
       <p:sp>
         <p:nvSpPr>
           <p:cNvPr id="2" name="Title 1"/>
@@ -3386,7 +3636,7 @@
           <a:lstStyle/>
           <a:p>
             <a:r>
-              <a:t>Model Training</a:t>
+              <a:t>Dataset Overview</a:t>
             </a:r>
           </a:p>
         </p:txBody>
@@ -3406,18 +3656,27 @@
           <a:bodyPr/>
           <a:lstStyle/>
           <a:p>
-            <a:r>
-              <a:t>• Used Random Forest Classifier.</a:t>
-            </a:r>
-          </a:p>
-          <a:p>
-            <a:r>
-              <a:t>• Trained the model on 80% of the data.</a:t>
-            </a:r>
-          </a:p>
-          <a:p>
-            <a:r>
-              <a:t>• Performed predictions on test set.</a:t>
+            <a:pPr marL="0" indent="0">
+              <a:buNone/>
+            </a:pPr>
+            <a:r>
+              <a:t>• Contains 11 features and 1 target label.</a:t>
+            </a:r>
+          </a:p>
+          <a:p>
+            <a:pPr marL="0" indent="0">
+              <a:buNone/>
+            </a:pPr>
+            <a:r>
+              <a:t>• Features include age, sex, blood pressure, cholesterol, ECG, etc.</a:t>
+            </a:r>
+          </a:p>
+          <a:p>
+            <a:pPr marL="0" indent="0">
+              <a:buNone/>
+            </a:pPr>
+            <a:r>
+              <a:t>• Target: 1 = Heart Disease, 0 = No Disease.</a:t>
             </a:r>
           </a:p>
         </p:txBody>
@@ -3427,11 +3686,23 @@
   <p:clrMapOvr>
     <a:masterClrMapping/>
   </p:clrMapOvr>
+  <mc:AlternateContent xmlns:mc="http://schemas.openxmlformats.org/markup-compatibility/2006">
+    <mc:Choice xmlns:p14="http://schemas.microsoft.com/office/powerpoint/2010/main" Requires="p14">
+      <p:transition spd="med" p14:dur="700">
+        <p:fade/>
+      </p:transition>
+    </mc:Choice>
+    <mc:Fallback>
+      <p:transition spd="med">
+        <p:fade/>
+      </p:transition>
+    </mc:Fallback>
+  </mc:AlternateContent>
 </p:sld>
 </file>
 
-<file path=ppt/slides/slide6.xml><?xml version="1.0" encoding="utf-8"?>
-<p:sld xmlns:a="http://schemas.openxmlformats.org/drawingml/2006/main" xmlns:p="http://schemas.openxmlformats.org/presentationml/2006/main" xmlns:r="http://schemas.openxmlformats.org/officeDocument/2006/relationships">
+<file path=ppt/slides/slide4.xml><?xml version="1.0" encoding="utf-8"?>
+<p:sld xmlns:a="http://schemas.openxmlformats.org/drawingml/2006/main" xmlns:r="http://schemas.openxmlformats.org/officeDocument/2006/relationships" xmlns:p="http://schemas.openxmlformats.org/presentationml/2006/main">
   <p:cSld>
     <p:spTree>
       <p:nvGrpSpPr>
@@ -3439,7 +3710,14 @@
         <p:cNvGrpSpPr/>
         <p:nvPr/>
       </p:nvGrpSpPr>
-      <p:grpSpPr/>
+      <p:grpSpPr>
+        <a:xfrm>
+          <a:off x="0" y="0"/>
+          <a:ext cx="0" cy="0"/>
+          <a:chOff x="0" y="0"/>
+          <a:chExt cx="0" cy="0"/>
+        </a:xfrm>
+      </p:grpSpPr>
       <p:sp>
         <p:nvSpPr>
           <p:cNvPr id="2" name="Title 1"/>
@@ -3456,7 +3734,7 @@
           <a:lstStyle/>
           <a:p>
             <a:r>
-              <a:t>Model Evaluation</a:t>
+              <a:t>Data Preprocessing</a:t>
             </a:r>
           </a:p>
         </p:txBody>
@@ -3476,18 +3754,35 @@
           <a:bodyPr/>
           <a:lstStyle/>
           <a:p>
-            <a:r>
-              <a:t>• Accuracy: ~85%-90%.</a:t>
-            </a:r>
-          </a:p>
-          <a:p>
-            <a:r>
-              <a:t>• Confusion Matrix: Good balance of TP and TN.</a:t>
-            </a:r>
-          </a:p>
-          <a:p>
-            <a:r>
-              <a:t>• Precision, Recall, and F1 Score reported from classification report.</a:t>
+            <a:pPr marL="0" indent="0">
+              <a:buNone/>
+            </a:pPr>
+            <a:r>
+              <a:t>• Checked and confirmed no missing values.</a:t>
+            </a:r>
+          </a:p>
+          <a:p>
+            <a:pPr marL="0" indent="0">
+              <a:buNone/>
+            </a:pPr>
+            <a:r>
+              <a:t>• Separated features (X) and target (y).</a:t>
+            </a:r>
+          </a:p>
+          <a:p>
+            <a:pPr marL="0" indent="0">
+              <a:buNone/>
+            </a:pPr>
+            <a:r>
+              <a:t>• Scaled data using StandardScaler.</a:t>
+            </a:r>
+          </a:p>
+          <a:p>
+            <a:pPr marL="0" indent="0">
+              <a:buNone/>
+            </a:pPr>
+            <a:r>
+              <a:t>• Split into train-test sets (80%-20%).</a:t>
             </a:r>
           </a:p>
         </p:txBody>
@@ -3497,11 +3792,23 @@
   <p:clrMapOvr>
     <a:masterClrMapping/>
   </p:clrMapOvr>
+  <mc:AlternateContent xmlns:mc="http://schemas.openxmlformats.org/markup-compatibility/2006">
+    <mc:Choice xmlns:p14="http://schemas.microsoft.com/office/powerpoint/2010/main" Requires="p14">
+      <p:transition spd="med" p14:dur="700">
+        <p:fade/>
+      </p:transition>
+    </mc:Choice>
+    <mc:Fallback>
+      <p:transition spd="med">
+        <p:fade/>
+      </p:transition>
+    </mc:Fallback>
+  </mc:AlternateContent>
 </p:sld>
 </file>
 
-<file path=ppt/slides/slide7.xml><?xml version="1.0" encoding="utf-8"?>
-<p:sld xmlns:a="http://schemas.openxmlformats.org/drawingml/2006/main" xmlns:p="http://schemas.openxmlformats.org/presentationml/2006/main" xmlns:r="http://schemas.openxmlformats.org/officeDocument/2006/relationships">
+<file path=ppt/slides/slide5.xml><?xml version="1.0" encoding="utf-8"?>
+<p:sld xmlns:a="http://schemas.openxmlformats.org/drawingml/2006/main" xmlns:r="http://schemas.openxmlformats.org/officeDocument/2006/relationships" xmlns:p="http://schemas.openxmlformats.org/presentationml/2006/main">
   <p:cSld>
     <p:spTree>
       <p:nvGrpSpPr>
@@ -3509,10 +3816,23 @@
         <p:cNvGrpSpPr/>
         <p:nvPr/>
       </p:nvGrpSpPr>
-      <p:grpSpPr/>
-      <p:sp>
-        <p:nvSpPr>
-          <p:cNvPr id="2" name="Title 1"/>
+      <p:grpSpPr>
+        <a:xfrm>
+          <a:off x="0" y="0"/>
+          <a:ext cx="0" cy="0"/>
+          <a:chOff x="0" y="0"/>
+          <a:chExt cx="0" cy="0"/>
+        </a:xfrm>
+      </p:grpSpPr>
+      <p:sp>
+        <p:nvSpPr>
+          <p:cNvPr id="2" name="Title 1">
+            <a:extLst>
+              <a:ext uri="{FF2B5EF4-FFF2-40B4-BE49-F238E27FC236}">
+                <a16:creationId xmlns:a16="http://schemas.microsoft.com/office/drawing/2014/main" id="{AAD38571-54B9-2368-2A8F-FD7727602C23}"/>
+              </a:ext>
+            </a:extLst>
+          </p:cNvPr>
           <p:cNvSpPr>
             <a:spLocks noGrp="1"/>
           </p:cNvSpPr>
@@ -3526,52 +3846,499 @@
           <a:lstStyle/>
           <a:p>
             <a:r>
-              <a:t>Sample Prediction</a:t>
-            </a:r>
-          </a:p>
-        </p:txBody>
-      </p:sp>
-      <p:sp>
-        <p:nvSpPr>
-          <p:cNvPr id="3" name="Content Placeholder 2"/>
-          <p:cNvSpPr>
-            <a:spLocks noGrp="1"/>
-          </p:cNvSpPr>
-          <p:nvPr>
-            <p:ph idx="1"/>
-          </p:nvPr>
-        </p:nvSpPr>
-        <p:spPr/>
-        <p:txBody>
-          <a:bodyPr/>
-          <a:lstStyle/>
-          <a:p>
-            <a:r>
-              <a:t>• Input: New patient data with 11 features.</a:t>
-            </a:r>
-          </a:p>
-          <a:p>
-            <a:r>
-              <a:t>• Preprocessed using the same scaler.</a:t>
-            </a:r>
-          </a:p>
-          <a:p>
-            <a:r>
-              <a:t>• Model predicted: Heart Disease or Normal.</a:t>
-            </a:r>
+              <a:rPr lang="en-US"/>
+              <a:t>DATA VISUALISATION</a:t>
+            </a:r>
+            <a:endParaRPr lang="en-IN"/>
+          </a:p>
+        </p:txBody>
+      </p:sp>
+      <p:pic>
+        <p:nvPicPr>
+          <p:cNvPr id="5" name="Content Placeholder 4">
+            <a:extLst>
+              <a:ext uri="{FF2B5EF4-FFF2-40B4-BE49-F238E27FC236}">
+                <a16:creationId xmlns:a16="http://schemas.microsoft.com/office/drawing/2014/main" id="{5FB7C702-C012-DDFA-82EB-21E7E499D2BF}"/>
+              </a:ext>
+            </a:extLst>
+          </p:cNvPr>
+          <p:cNvPicPr>
+            <a:picLocks noGrp="1" noChangeAspect="1"/>
+          </p:cNvPicPr>
+          <p:nvPr>
+            <p:ph sz="half" idx="2"/>
+          </p:nvPr>
+        </p:nvPicPr>
+        <p:blipFill>
+          <a:blip r:embed="rId2"/>
+          <a:stretch>
+            <a:fillRect/>
+          </a:stretch>
+        </p:blipFill>
+        <p:spPr>
+          <a:xfrm>
+            <a:off x="4475661" y="1532750"/>
+            <a:ext cx="4668339" cy="4915184"/>
+          </a:xfrm>
+        </p:spPr>
+      </p:pic>
+      <p:sp>
+        <p:nvSpPr>
+          <p:cNvPr id="9" name="Rectangle 1">
+            <a:extLst>
+              <a:ext uri="{FF2B5EF4-FFF2-40B4-BE49-F238E27FC236}">
+                <a16:creationId xmlns:a16="http://schemas.microsoft.com/office/drawing/2014/main" id="{78118352-6972-33DF-A436-86F0EC44832C}"/>
+              </a:ext>
+            </a:extLst>
+          </p:cNvPr>
+          <p:cNvSpPr>
+            <a:spLocks noGrp="1" noChangeArrowheads="1"/>
+          </p:cNvSpPr>
+          <p:nvPr>
+            <p:ph sz="quarter" idx="4"/>
+          </p:nvPr>
+        </p:nvSpPr>
+        <p:spPr bwMode="auto">
+          <a:xfrm>
+            <a:off x="195093" y="1880822"/>
+            <a:ext cx="4376907" cy="4524315"/>
+          </a:xfrm>
+          <a:prstGeom prst="rect">
+            <a:avLst/>
+          </a:prstGeom>
+          <a:noFill/>
+          <a:ln>
+            <a:noFill/>
+          </a:ln>
+          <a:effectLst/>
+          <a:extLst>
+            <a:ext uri="{909E8E84-426E-40DD-AFC4-6F175D3DCCD1}">
+              <a14:hiddenFill xmlns:a14="http://schemas.microsoft.com/office/drawing/2010/main">
+                <a:solidFill>
+                  <a:schemeClr val="accent1"/>
+                </a:solidFill>
+              </a14:hiddenFill>
+            </a:ext>
+            <a:ext uri="{91240B29-F687-4F45-9708-019B960494DF}">
+              <a14:hiddenLine xmlns:a14="http://schemas.microsoft.com/office/drawing/2010/main" w="9525">
+                <a:solidFill>
+                  <a:schemeClr val="tx1"/>
+                </a:solidFill>
+                <a:miter lim="800000"/>
+                <a:headEnd/>
+                <a:tailEnd/>
+              </a14:hiddenLine>
+            </a:ext>
+            <a:ext uri="{AF507438-7753-43E0-B8FC-AC1667EBCBE1}">
+              <a14:hiddenEffects xmlns:a14="http://schemas.microsoft.com/office/drawing/2010/main">
+                <a:effectLst>
+                  <a:outerShdw dist="35921" dir="2700000" algn="ctr" rotWithShape="0">
+                    <a:schemeClr val="bg2"/>
+                  </a:outerShdw>
+                </a:effectLst>
+              </a14:hiddenEffects>
+            </a:ext>
+          </a:extLst>
+        </p:spPr>
+        <p:txBody>
+          <a:bodyPr vert="horz" wrap="square" lIns="91440" tIns="45720" rIns="91440" bIns="45720" numCol="1" anchor="ctr" anchorCtr="0" compatLnSpc="1">
+            <a:prstTxWarp prst="textNoShape">
+              <a:avLst/>
+            </a:prstTxWarp>
+            <a:spAutoFit/>
+          </a:bodyPr>
+          <a:lstStyle/>
+          <a:p>
+            <a:pPr marL="0" marR="0" lvl="0" indent="0" algn="l" defTabSz="914400" rtl="0" eaLnBrk="0" fontAlgn="base" latinLnBrk="0" hangingPunct="0">
+              <a:lnSpc>
+                <a:spcPct val="150000"/>
+              </a:lnSpc>
+              <a:spcBef>
+                <a:spcPct val="0"/>
+              </a:spcBef>
+              <a:spcAft>
+                <a:spcPct val="0"/>
+              </a:spcAft>
+              <a:buClrTx/>
+              <a:buSzTx/>
+              <a:buFontTx/>
+              <a:buNone/>
+              <a:tabLst/>
+            </a:pPr>
+            <a:r>
+              <a:rPr kumimoji="0" lang="en-US" altLang="en-US" sz="1500" b="1" i="0" u="none" strike="noStrike" cap="none" normalizeH="0" baseline="0">
+                <a:ln>
+                  <a:noFill/>
+                </a:ln>
+                <a:solidFill>
+                  <a:schemeClr val="tx1"/>
+                </a:solidFill>
+                <a:effectLst/>
+                <a:latin typeface="Arial" panose="020B0604020202020204" pitchFamily="34" charset="0"/>
+              </a:rPr>
+              <a:t>Target Distribution – Heart Disease Cases</a:t>
+            </a:r>
+            <a:endParaRPr kumimoji="0" lang="en-US" altLang="en-US" sz="1500" b="0" i="0" u="none" strike="noStrike" cap="none" normalizeH="0" baseline="0">
+              <a:ln>
+                <a:noFill/>
+              </a:ln>
+              <a:solidFill>
+                <a:schemeClr val="tx1"/>
+              </a:solidFill>
+              <a:effectLst/>
+            </a:endParaRPr>
+          </a:p>
+          <a:p>
+            <a:pPr marL="0" marR="0" lvl="0" indent="0" algn="l" defTabSz="914400" rtl="0" eaLnBrk="0" fontAlgn="base" latinLnBrk="0" hangingPunct="0">
+              <a:lnSpc>
+                <a:spcPct val="150000"/>
+              </a:lnSpc>
+              <a:spcBef>
+                <a:spcPct val="0"/>
+              </a:spcBef>
+              <a:spcAft>
+                <a:spcPct val="0"/>
+              </a:spcAft>
+              <a:buClrTx/>
+              <a:buSzTx/>
+              <a:buFontTx/>
+              <a:buNone/>
+              <a:tabLst/>
+            </a:pPr>
+            <a:r>
+              <a:rPr kumimoji="0" lang="en-US" altLang="en-US" sz="1500" b="1" i="0" u="none" strike="noStrike" cap="none" normalizeH="0" baseline="0">
+                <a:ln>
+                  <a:noFill/>
+                </a:ln>
+                <a:solidFill>
+                  <a:schemeClr val="tx1"/>
+                </a:solidFill>
+                <a:effectLst/>
+                <a:latin typeface="Arial" panose="020B0604020202020204" pitchFamily="34" charset="0"/>
+              </a:rPr>
+              <a:t>Explanation:</a:t>
+            </a:r>
+            <a:endParaRPr kumimoji="0" lang="en-US" altLang="en-US" sz="1500" b="0" i="0" u="none" strike="noStrike" cap="none" normalizeH="0" baseline="0">
+              <a:ln>
+                <a:noFill/>
+              </a:ln>
+              <a:solidFill>
+                <a:schemeClr val="tx1"/>
+              </a:solidFill>
+              <a:effectLst/>
+              <a:latin typeface="Arial" panose="020B0604020202020204" pitchFamily="34" charset="0"/>
+            </a:endParaRPr>
+          </a:p>
+          <a:p>
+            <a:pPr marL="0" marR="0" lvl="0" indent="0" algn="l" defTabSz="914400" rtl="0" eaLnBrk="0" fontAlgn="base" latinLnBrk="0" hangingPunct="0">
+              <a:lnSpc>
+                <a:spcPct val="150000"/>
+              </a:lnSpc>
+              <a:spcBef>
+                <a:spcPct val="0"/>
+              </a:spcBef>
+              <a:spcAft>
+                <a:spcPct val="0"/>
+              </a:spcAft>
+              <a:buClrTx/>
+              <a:buSzTx/>
+              <a:buFontTx/>
+              <a:buChar char="•"/>
+              <a:tabLst/>
+            </a:pPr>
+            <a:r>
+              <a:rPr kumimoji="0" lang="en-US" altLang="en-US" sz="1500" b="0" i="0" u="none" strike="noStrike" cap="none" normalizeH="0" baseline="0">
+                <a:ln>
+                  <a:noFill/>
+                </a:ln>
+                <a:solidFill>
+                  <a:schemeClr val="tx1"/>
+                </a:solidFill>
+                <a:effectLst/>
+                <a:latin typeface="Arial" panose="020B0604020202020204" pitchFamily="34" charset="0"/>
+              </a:rPr>
+              <a:t>This bar plot shows the distribution of heart disease cases in the dataset.</a:t>
+            </a:r>
+          </a:p>
+          <a:p>
+            <a:pPr marL="0" marR="0" lvl="0" indent="0" algn="l" defTabSz="914400" rtl="0" eaLnBrk="0" fontAlgn="base" latinLnBrk="0" hangingPunct="0">
+              <a:lnSpc>
+                <a:spcPct val="150000"/>
+              </a:lnSpc>
+              <a:spcBef>
+                <a:spcPct val="0"/>
+              </a:spcBef>
+              <a:spcAft>
+                <a:spcPct val="0"/>
+              </a:spcAft>
+              <a:buClrTx/>
+              <a:buSzTx/>
+              <a:buFontTx/>
+              <a:buChar char="•"/>
+              <a:tabLst/>
+            </a:pPr>
+            <a:r>
+              <a:rPr kumimoji="0" lang="en-US" altLang="en-US" sz="1500" b="0" i="0" u="none" strike="noStrike" cap="none" normalizeH="0" baseline="0">
+                <a:ln>
+                  <a:noFill/>
+                </a:ln>
+                <a:solidFill>
+                  <a:schemeClr val="tx1"/>
+                </a:solidFill>
+                <a:effectLst/>
+                <a:latin typeface="Arial" panose="020B0604020202020204" pitchFamily="34" charset="0"/>
+              </a:rPr>
+              <a:t>The target variable is binary:</a:t>
+            </a:r>
+          </a:p>
+          <a:p>
+            <a:pPr marL="457200" marR="0" lvl="1" indent="0" algn="l" defTabSz="914400" rtl="0" eaLnBrk="0" fontAlgn="base" latinLnBrk="0" hangingPunct="0">
+              <a:lnSpc>
+                <a:spcPct val="150000"/>
+              </a:lnSpc>
+              <a:spcBef>
+                <a:spcPct val="0"/>
+              </a:spcBef>
+              <a:spcAft>
+                <a:spcPct val="0"/>
+              </a:spcAft>
+              <a:buClrTx/>
+              <a:buSzTx/>
+              <a:buFontTx/>
+              <a:buChar char="•"/>
+              <a:tabLst/>
+            </a:pPr>
+            <a:r>
+              <a:rPr kumimoji="0" lang="en-US" altLang="en-US" sz="1500" b="0" i="0" u="none" strike="noStrike" cap="none" normalizeH="0" baseline="0">
+                <a:ln>
+                  <a:noFill/>
+                </a:ln>
+                <a:solidFill>
+                  <a:schemeClr val="tx1"/>
+                </a:solidFill>
+                <a:effectLst/>
+                <a:latin typeface="Arial Unicode MS"/>
+              </a:rPr>
+              <a:t>0</a:t>
+            </a:r>
+            <a:r>
+              <a:rPr kumimoji="0" lang="en-US" altLang="en-US" sz="1500" b="0" i="0" u="none" strike="noStrike" cap="none" normalizeH="0" baseline="0">
+                <a:ln>
+                  <a:noFill/>
+                </a:ln>
+                <a:solidFill>
+                  <a:schemeClr val="tx1"/>
+                </a:solidFill>
+                <a:effectLst/>
+              </a:rPr>
+              <a:t> = No Heart Disease</a:t>
+            </a:r>
+            <a:endParaRPr kumimoji="0" lang="en-US" altLang="en-US" sz="1500" b="0" i="0" u="none" strike="noStrike" cap="none" normalizeH="0" baseline="0">
+              <a:ln>
+                <a:noFill/>
+              </a:ln>
+              <a:solidFill>
+                <a:schemeClr val="tx1"/>
+              </a:solidFill>
+              <a:effectLst/>
+              <a:latin typeface="Arial" panose="020B0604020202020204" pitchFamily="34" charset="0"/>
+            </a:endParaRPr>
+          </a:p>
+          <a:p>
+            <a:pPr marL="457200" marR="0" lvl="1" indent="0" algn="l" defTabSz="914400" rtl="0" eaLnBrk="0" fontAlgn="base" latinLnBrk="0" hangingPunct="0">
+              <a:lnSpc>
+                <a:spcPct val="150000"/>
+              </a:lnSpc>
+              <a:spcBef>
+                <a:spcPct val="0"/>
+              </a:spcBef>
+              <a:spcAft>
+                <a:spcPct val="0"/>
+              </a:spcAft>
+              <a:buClrTx/>
+              <a:buSzTx/>
+              <a:buFontTx/>
+              <a:buChar char="•"/>
+              <a:tabLst/>
+            </a:pPr>
+            <a:r>
+              <a:rPr kumimoji="0" lang="en-US" altLang="en-US" sz="1500" b="0" i="0" u="none" strike="noStrike" cap="none" normalizeH="0" baseline="0">
+                <a:ln>
+                  <a:noFill/>
+                </a:ln>
+                <a:solidFill>
+                  <a:schemeClr val="tx1"/>
+                </a:solidFill>
+                <a:effectLst/>
+                <a:latin typeface="Arial Unicode MS"/>
+              </a:rPr>
+              <a:t>1</a:t>
+            </a:r>
+            <a:r>
+              <a:rPr kumimoji="0" lang="en-US" altLang="en-US" sz="1500" b="0" i="0" u="none" strike="noStrike" cap="none" normalizeH="0" baseline="0">
+                <a:ln>
+                  <a:noFill/>
+                </a:ln>
+                <a:solidFill>
+                  <a:schemeClr val="tx1"/>
+                </a:solidFill>
+                <a:effectLst/>
+              </a:rPr>
+              <a:t> = Heart Disease</a:t>
+            </a:r>
+            <a:endParaRPr kumimoji="0" lang="en-US" altLang="en-US" sz="1500" b="0" i="0" u="none" strike="noStrike" cap="none" normalizeH="0" baseline="0">
+              <a:ln>
+                <a:noFill/>
+              </a:ln>
+              <a:solidFill>
+                <a:schemeClr val="tx1"/>
+              </a:solidFill>
+              <a:effectLst/>
+              <a:latin typeface="Arial" panose="020B0604020202020204" pitchFamily="34" charset="0"/>
+            </a:endParaRPr>
+          </a:p>
+          <a:p>
+            <a:pPr marL="0" marR="0" lvl="0" indent="0" algn="l" defTabSz="914400" rtl="0" eaLnBrk="0" fontAlgn="base" latinLnBrk="0" hangingPunct="0">
+              <a:lnSpc>
+                <a:spcPct val="150000"/>
+              </a:lnSpc>
+              <a:spcBef>
+                <a:spcPct val="0"/>
+              </a:spcBef>
+              <a:spcAft>
+                <a:spcPct val="0"/>
+              </a:spcAft>
+              <a:buClrTx/>
+              <a:buSzTx/>
+              <a:buFontTx/>
+              <a:buChar char="•"/>
+              <a:tabLst/>
+            </a:pPr>
+            <a:r>
+              <a:rPr kumimoji="0" lang="en-US" altLang="en-US" sz="1500" b="0" i="0" u="none" strike="noStrike" cap="none" normalizeH="0" baseline="0">
+                <a:ln>
+                  <a:noFill/>
+                </a:ln>
+                <a:solidFill>
+                  <a:schemeClr val="tx1"/>
+                </a:solidFill>
+                <a:effectLst/>
+                <a:latin typeface="Arial" panose="020B0604020202020204" pitchFamily="34" charset="0"/>
+              </a:rPr>
+              <a:t>The dataset is fairly </a:t>
+            </a:r>
+            <a:r>
+              <a:rPr kumimoji="0" lang="en-US" altLang="en-US" sz="1500" b="1" i="0" u="none" strike="noStrike" cap="none" normalizeH="0" baseline="0">
+                <a:ln>
+                  <a:noFill/>
+                </a:ln>
+                <a:solidFill>
+                  <a:schemeClr val="tx1"/>
+                </a:solidFill>
+                <a:effectLst/>
+                <a:latin typeface="Arial" panose="020B0604020202020204" pitchFamily="34" charset="0"/>
+              </a:rPr>
+              <a:t>balanced</a:t>
+            </a:r>
+            <a:r>
+              <a:rPr kumimoji="0" lang="en-US" altLang="en-US" sz="1500" b="0" i="0" u="none" strike="noStrike" cap="none" normalizeH="0" baseline="0">
+                <a:ln>
+                  <a:noFill/>
+                </a:ln>
+                <a:solidFill>
+                  <a:schemeClr val="tx1"/>
+                </a:solidFill>
+                <a:effectLst/>
+                <a:latin typeface="Arial" panose="020B0604020202020204" pitchFamily="34" charset="0"/>
+              </a:rPr>
+              <a:t>, with a slight majority of patients having heart disease.</a:t>
+            </a:r>
+          </a:p>
+          <a:p>
+            <a:pPr marL="0" marR="0" lvl="0" indent="0" algn="l" defTabSz="914400" rtl="0" eaLnBrk="0" fontAlgn="base" latinLnBrk="0" hangingPunct="0">
+              <a:lnSpc>
+                <a:spcPct val="150000"/>
+              </a:lnSpc>
+              <a:spcBef>
+                <a:spcPct val="0"/>
+              </a:spcBef>
+              <a:spcAft>
+                <a:spcPct val="0"/>
+              </a:spcAft>
+              <a:buClrTx/>
+              <a:buSzTx/>
+              <a:buFontTx/>
+              <a:buChar char="•"/>
+              <a:tabLst/>
+            </a:pPr>
+            <a:r>
+              <a:rPr kumimoji="0" lang="en-US" altLang="en-US" sz="1500" b="0" i="0" u="none" strike="noStrike" cap="none" normalizeH="0" baseline="0">
+                <a:ln>
+                  <a:noFill/>
+                </a:ln>
+                <a:solidFill>
+                  <a:schemeClr val="tx1"/>
+                </a:solidFill>
+                <a:effectLst/>
+                <a:latin typeface="Arial" panose="020B0604020202020204" pitchFamily="34" charset="0"/>
+              </a:rPr>
+              <a:t>✅ This balance means we can confidently use accuracy and other standard metrics without needing oversampling or reweighting.</a:t>
+            </a:r>
+          </a:p>
+          <a:p>
+            <a:pPr marL="0" marR="0" lvl="0" indent="0" algn="l" defTabSz="914400" rtl="0" eaLnBrk="0" fontAlgn="base" latinLnBrk="0" hangingPunct="0">
+              <a:spcBef>
+                <a:spcPct val="0"/>
+              </a:spcBef>
+              <a:spcAft>
+                <a:spcPct val="0"/>
+              </a:spcAft>
+              <a:buClrTx/>
+              <a:buSzTx/>
+              <a:buFontTx/>
+              <a:buNone/>
+              <a:tabLst/>
+            </a:pPr>
+            <a:endParaRPr kumimoji="0" lang="en-US" altLang="en-US" sz="1800" b="0" i="0" u="none" strike="noStrike" cap="none" normalizeH="0" baseline="0">
+              <a:ln>
+                <a:noFill/>
+              </a:ln>
+              <a:solidFill>
+                <a:schemeClr val="tx1"/>
+              </a:solidFill>
+              <a:effectLst/>
+              <a:latin typeface="Arial" panose="020B0604020202020204" pitchFamily="34" charset="0"/>
+            </a:endParaRPr>
           </a:p>
         </p:txBody>
       </p:sp>
     </p:spTree>
+    <p:extLst>
+      <p:ext uri="{BB962C8B-B14F-4D97-AF65-F5344CB8AC3E}">
+        <p14:creationId xmlns:p14="http://schemas.microsoft.com/office/powerpoint/2010/main" val="939507249"/>
+      </p:ext>
+    </p:extLst>
   </p:cSld>
   <p:clrMapOvr>
     <a:masterClrMapping/>
   </p:clrMapOvr>
+  <mc:AlternateContent xmlns:mc="http://schemas.openxmlformats.org/markup-compatibility/2006">
+    <mc:Choice xmlns:p14="http://schemas.microsoft.com/office/powerpoint/2010/main" Requires="p14">
+      <p:transition spd="med" p14:dur="700">
+        <p:fade/>
+      </p:transition>
+    </mc:Choice>
+    <mc:Fallback>
+      <p:transition spd="med">
+        <p:fade/>
+      </p:transition>
+    </mc:Fallback>
+  </mc:AlternateContent>
 </p:sld>
 </file>
 
-<file path=ppt/slides/slide8.xml><?xml version="1.0" encoding="utf-8"?>
-<p:sld xmlns:a="http://schemas.openxmlformats.org/drawingml/2006/main" xmlns:p="http://schemas.openxmlformats.org/presentationml/2006/main" xmlns:r="http://schemas.openxmlformats.org/officeDocument/2006/relationships">
+<file path=ppt/slides/slide6.xml><?xml version="1.0" encoding="utf-8"?>
+<p:sld xmlns:a="http://schemas.openxmlformats.org/drawingml/2006/main" xmlns:r="http://schemas.openxmlformats.org/officeDocument/2006/relationships" xmlns:p="http://schemas.openxmlformats.org/presentationml/2006/main">
   <p:cSld>
     <p:spTree>
       <p:nvGrpSpPr>
@@ -3579,7 +4346,563 @@
         <p:cNvGrpSpPr/>
         <p:nvPr/>
       </p:nvGrpSpPr>
-      <p:grpSpPr/>
+      <p:grpSpPr>
+        <a:xfrm>
+          <a:off x="0" y="0"/>
+          <a:ext cx="0" cy="0"/>
+          <a:chOff x="0" y="0"/>
+          <a:chExt cx="0" cy="0"/>
+        </a:xfrm>
+      </p:grpSpPr>
+      <p:sp>
+        <p:nvSpPr>
+          <p:cNvPr id="7" name="Rectangle 1">
+            <a:extLst>
+              <a:ext uri="{FF2B5EF4-FFF2-40B4-BE49-F238E27FC236}">
+                <a16:creationId xmlns:a16="http://schemas.microsoft.com/office/drawing/2014/main" id="{EC365C5F-B37D-B5BC-FBCF-F00B0C9514F1}"/>
+              </a:ext>
+            </a:extLst>
+          </p:cNvPr>
+          <p:cNvSpPr>
+            <a:spLocks noGrp="1" noChangeArrowheads="1"/>
+          </p:cNvSpPr>
+          <p:nvPr>
+            <p:ph sz="half" idx="1"/>
+          </p:nvPr>
+        </p:nvSpPr>
+        <p:spPr bwMode="auto">
+          <a:xfrm>
+            <a:off x="457200" y="261687"/>
+            <a:ext cx="3709447" cy="6974538"/>
+          </a:xfrm>
+          <a:prstGeom prst="rect">
+            <a:avLst/>
+          </a:prstGeom>
+          <a:noFill/>
+          <a:ln>
+            <a:noFill/>
+          </a:ln>
+          <a:effectLst/>
+          <a:extLst>
+            <a:ext uri="{909E8E84-426E-40DD-AFC4-6F175D3DCCD1}">
+              <a14:hiddenFill xmlns:a14="http://schemas.microsoft.com/office/drawing/2010/main">
+                <a:solidFill>
+                  <a:schemeClr val="accent1"/>
+                </a:solidFill>
+              </a14:hiddenFill>
+            </a:ext>
+            <a:ext uri="{91240B29-F687-4F45-9708-019B960494DF}">
+              <a14:hiddenLine xmlns:a14="http://schemas.microsoft.com/office/drawing/2010/main" w="9525">
+                <a:solidFill>
+                  <a:schemeClr val="tx1"/>
+                </a:solidFill>
+                <a:miter lim="800000"/>
+                <a:headEnd/>
+                <a:tailEnd/>
+              </a14:hiddenLine>
+            </a:ext>
+            <a:ext uri="{AF507438-7753-43E0-B8FC-AC1667EBCBE1}">
+              <a14:hiddenEffects xmlns:a14="http://schemas.microsoft.com/office/drawing/2010/main">
+                <a:effectLst>
+                  <a:outerShdw dist="35921" dir="2700000" algn="ctr" rotWithShape="0">
+                    <a:schemeClr val="bg2"/>
+                  </a:outerShdw>
+                </a:effectLst>
+              </a14:hiddenEffects>
+            </a:ext>
+          </a:extLst>
+        </p:spPr>
+        <p:txBody>
+          <a:bodyPr vert="horz" wrap="square" lIns="91440" tIns="45720" rIns="91440" bIns="45720" numCol="1" anchor="ctr" anchorCtr="0" compatLnSpc="1">
+            <a:prstTxWarp prst="textNoShape">
+              <a:avLst/>
+            </a:prstTxWarp>
+            <a:spAutoFit/>
+          </a:bodyPr>
+          <a:lstStyle/>
+          <a:p>
+            <a:pPr marL="0" marR="0" lvl="0" indent="0" algn="l" defTabSz="914400" rtl="0" eaLnBrk="0" fontAlgn="base" latinLnBrk="0" hangingPunct="0">
+              <a:lnSpc>
+                <a:spcPct val="150000"/>
+              </a:lnSpc>
+              <a:spcBef>
+                <a:spcPct val="0"/>
+              </a:spcBef>
+              <a:spcAft>
+                <a:spcPct val="0"/>
+              </a:spcAft>
+              <a:buClrTx/>
+              <a:buSzTx/>
+              <a:buFontTx/>
+              <a:buNone/>
+              <a:tabLst/>
+            </a:pPr>
+            <a:r>
+              <a:rPr kumimoji="0" lang="en-US" altLang="en-US" sz="1500" b="1" i="0" u="none" strike="noStrike" cap="none" normalizeH="0" baseline="0">
+                <a:ln>
+                  <a:noFill/>
+                </a:ln>
+                <a:solidFill>
+                  <a:schemeClr val="tx1"/>
+                </a:solidFill>
+                <a:effectLst/>
+                <a:latin typeface="Arial" panose="020B0604020202020204" pitchFamily="34" charset="0"/>
+              </a:rPr>
+              <a:t>Correlation Heatmap – Feature Relationships</a:t>
+            </a:r>
+          </a:p>
+          <a:p>
+            <a:pPr marL="0" marR="0" lvl="0" indent="0" algn="l" defTabSz="914400" rtl="0" eaLnBrk="0" fontAlgn="base" latinLnBrk="0" hangingPunct="0">
+              <a:lnSpc>
+                <a:spcPct val="150000"/>
+              </a:lnSpc>
+              <a:spcBef>
+                <a:spcPct val="0"/>
+              </a:spcBef>
+              <a:spcAft>
+                <a:spcPct val="0"/>
+              </a:spcAft>
+              <a:buClrTx/>
+              <a:buSzTx/>
+              <a:buFontTx/>
+              <a:buNone/>
+              <a:tabLst/>
+            </a:pPr>
+            <a:r>
+              <a:rPr kumimoji="0" lang="en-US" altLang="en-US" sz="1500" b="1" i="0" u="none" strike="noStrike" cap="none" normalizeH="0" baseline="0">
+                <a:ln>
+                  <a:noFill/>
+                </a:ln>
+                <a:solidFill>
+                  <a:schemeClr val="tx1"/>
+                </a:solidFill>
+                <a:effectLst/>
+                <a:latin typeface="Arial" panose="020B0604020202020204" pitchFamily="34" charset="0"/>
+              </a:rPr>
+              <a:t>Explanation:</a:t>
+            </a:r>
+            <a:r>
+              <a:rPr kumimoji="0" lang="en-US" altLang="en-US" sz="1500" b="0" i="0" u="none" strike="noStrike" cap="none" normalizeH="0" baseline="0">
+                <a:ln>
+                  <a:noFill/>
+                </a:ln>
+                <a:solidFill>
+                  <a:schemeClr val="tx1"/>
+                </a:solidFill>
+                <a:effectLst/>
+                <a:latin typeface="Arial" panose="020B0604020202020204" pitchFamily="34" charset="0"/>
+              </a:rPr>
+              <a:t>This heatmap shows </a:t>
+            </a:r>
+            <a:r>
+              <a:rPr kumimoji="0" lang="en-US" altLang="en-US" sz="1500" b="1" i="0" u="none" strike="noStrike" cap="none" normalizeH="0" baseline="0">
+                <a:ln>
+                  <a:noFill/>
+                </a:ln>
+                <a:solidFill>
+                  <a:schemeClr val="tx1"/>
+                </a:solidFill>
+                <a:effectLst/>
+                <a:latin typeface="Arial" panose="020B0604020202020204" pitchFamily="34" charset="0"/>
+              </a:rPr>
+              <a:t>Pearson correlation</a:t>
+            </a:r>
+            <a:r>
+              <a:rPr kumimoji="0" lang="en-US" altLang="en-US" sz="1500" b="0" i="0" u="none" strike="noStrike" cap="none" normalizeH="0" baseline="0">
+                <a:ln>
+                  <a:noFill/>
+                </a:ln>
+                <a:solidFill>
+                  <a:schemeClr val="tx1"/>
+                </a:solidFill>
+                <a:effectLst/>
+                <a:latin typeface="Arial" panose="020B0604020202020204" pitchFamily="34" charset="0"/>
+              </a:rPr>
+              <a:t> between features and the target variable.</a:t>
+            </a:r>
+          </a:p>
+          <a:p>
+            <a:pPr marL="0" marR="0" lvl="0" indent="0" algn="l" defTabSz="914400" rtl="0" eaLnBrk="0" fontAlgn="base" latinLnBrk="0" hangingPunct="0">
+              <a:lnSpc>
+                <a:spcPct val="150000"/>
+              </a:lnSpc>
+              <a:spcBef>
+                <a:spcPct val="0"/>
+              </a:spcBef>
+              <a:spcAft>
+                <a:spcPct val="0"/>
+              </a:spcAft>
+              <a:buClrTx/>
+              <a:buSzTx/>
+              <a:buFontTx/>
+              <a:buChar char="•"/>
+              <a:tabLst/>
+            </a:pPr>
+            <a:r>
+              <a:rPr kumimoji="0" lang="en-US" altLang="en-US" sz="1500" b="0" i="0" u="none" strike="noStrike" cap="none" normalizeH="0" baseline="0">
+                <a:ln>
+                  <a:noFill/>
+                </a:ln>
+                <a:solidFill>
+                  <a:schemeClr val="tx1"/>
+                </a:solidFill>
+                <a:effectLst/>
+                <a:latin typeface="Arial" panose="020B0604020202020204" pitchFamily="34" charset="0"/>
+              </a:rPr>
+              <a:t>Brighter colors (closer to 1 or -1) indicate stronger correlations.</a:t>
+            </a:r>
+          </a:p>
+          <a:p>
+            <a:pPr marL="0" marR="0" lvl="0" indent="0" algn="l" defTabSz="914400" rtl="0" eaLnBrk="0" fontAlgn="base" latinLnBrk="0" hangingPunct="0">
+              <a:lnSpc>
+                <a:spcPct val="150000"/>
+              </a:lnSpc>
+              <a:spcBef>
+                <a:spcPct val="0"/>
+              </a:spcBef>
+              <a:spcAft>
+                <a:spcPct val="0"/>
+              </a:spcAft>
+              <a:buClrTx/>
+              <a:buSzTx/>
+              <a:buFontTx/>
+              <a:buChar char="•"/>
+              <a:tabLst/>
+            </a:pPr>
+            <a:r>
+              <a:rPr kumimoji="0" lang="en-US" altLang="en-US" sz="1500" b="0" i="0" u="none" strike="noStrike" cap="none" normalizeH="0" baseline="0">
+                <a:ln>
+                  <a:noFill/>
+                </a:ln>
+                <a:solidFill>
+                  <a:schemeClr val="tx1"/>
+                </a:solidFill>
+                <a:effectLst/>
+                <a:latin typeface="Arial" panose="020B0604020202020204" pitchFamily="34" charset="0"/>
+              </a:rPr>
+              <a:t>Key observations:</a:t>
+            </a:r>
+          </a:p>
+          <a:p>
+            <a:pPr marL="457200" marR="0" lvl="1" indent="0" algn="l" defTabSz="914400" rtl="0" eaLnBrk="0" fontAlgn="base" latinLnBrk="0" hangingPunct="0">
+              <a:lnSpc>
+                <a:spcPct val="150000"/>
+              </a:lnSpc>
+              <a:spcBef>
+                <a:spcPct val="0"/>
+              </a:spcBef>
+              <a:spcAft>
+                <a:spcPct val="0"/>
+              </a:spcAft>
+              <a:buClrTx/>
+              <a:buSzTx/>
+              <a:buFontTx/>
+              <a:buChar char="•"/>
+              <a:tabLst/>
+            </a:pPr>
+            <a:r>
+              <a:rPr kumimoji="0" lang="en-US" altLang="en-US" sz="1500" b="0" i="0" u="none" strike="noStrike" cap="none" normalizeH="0" baseline="0">
+                <a:ln>
+                  <a:noFill/>
+                </a:ln>
+                <a:solidFill>
+                  <a:schemeClr val="tx1"/>
+                </a:solidFill>
+                <a:effectLst/>
+                <a:latin typeface="Arial Unicode MS"/>
+              </a:rPr>
+              <a:t>Chest pain type (0.46)</a:t>
+            </a:r>
+            <a:r>
+              <a:rPr kumimoji="0" lang="en-US" altLang="en-US" sz="1500" b="0" i="0" u="none" strike="noStrike" cap="none" normalizeH="0" baseline="0">
+                <a:ln>
+                  <a:noFill/>
+                </a:ln>
+                <a:solidFill>
+                  <a:schemeClr val="tx1"/>
+                </a:solidFill>
+                <a:effectLst/>
+              </a:rPr>
+              <a:t>, </a:t>
+            </a:r>
+            <a:r>
+              <a:rPr kumimoji="0" lang="en-US" altLang="en-US" sz="1500" b="0" i="0" u="none" strike="noStrike" cap="none" normalizeH="0" baseline="0">
+                <a:ln>
+                  <a:noFill/>
+                </a:ln>
+                <a:solidFill>
+                  <a:schemeClr val="tx1"/>
+                </a:solidFill>
+                <a:effectLst/>
+                <a:latin typeface="Arial Unicode MS"/>
+              </a:rPr>
+              <a:t>ST slope (0.51)</a:t>
+            </a:r>
+            <a:r>
+              <a:rPr kumimoji="0" lang="en-US" altLang="en-US" sz="1500" b="0" i="0" u="none" strike="noStrike" cap="none" normalizeH="0" baseline="0">
+                <a:ln>
+                  <a:noFill/>
+                </a:ln>
+                <a:solidFill>
+                  <a:schemeClr val="tx1"/>
+                </a:solidFill>
+                <a:effectLst/>
+              </a:rPr>
+              <a:t>, and </a:t>
+            </a:r>
+            <a:r>
+              <a:rPr kumimoji="0" lang="en-US" altLang="en-US" sz="1500" b="0" i="0" u="none" strike="noStrike" cap="none" normalizeH="0" baseline="0">
+                <a:ln>
+                  <a:noFill/>
+                </a:ln>
+                <a:solidFill>
+                  <a:schemeClr val="tx1"/>
+                </a:solidFill>
+                <a:effectLst/>
+                <a:latin typeface="Arial Unicode MS"/>
+              </a:rPr>
+              <a:t>Exercise-induced angina (0.48)</a:t>
+            </a:r>
+            <a:r>
+              <a:rPr kumimoji="0" lang="en-US" altLang="en-US" sz="1500" b="0" i="0" u="none" strike="noStrike" cap="none" normalizeH="0" baseline="0">
+                <a:ln>
+                  <a:noFill/>
+                </a:ln>
+                <a:solidFill>
+                  <a:schemeClr val="tx1"/>
+                </a:solidFill>
+                <a:effectLst/>
+              </a:rPr>
+              <a:t> show </a:t>
+            </a:r>
+            <a:r>
+              <a:rPr kumimoji="0" lang="en-US" altLang="en-US" sz="1500" b="1" i="0" u="none" strike="noStrike" cap="none" normalizeH="0" baseline="0">
+                <a:ln>
+                  <a:noFill/>
+                </a:ln>
+                <a:solidFill>
+                  <a:schemeClr val="tx1"/>
+                </a:solidFill>
+                <a:effectLst/>
+                <a:latin typeface="Arial" panose="020B0604020202020204" pitchFamily="34" charset="0"/>
+              </a:rPr>
+              <a:t>positive correlation</a:t>
+            </a:r>
+            <a:r>
+              <a:rPr kumimoji="0" lang="en-US" altLang="en-US" sz="1500" b="0" i="0" u="none" strike="noStrike" cap="none" normalizeH="0" baseline="0">
+                <a:ln>
+                  <a:noFill/>
+                </a:ln>
+                <a:solidFill>
+                  <a:schemeClr val="tx1"/>
+                </a:solidFill>
+                <a:effectLst/>
+                <a:latin typeface="Arial" panose="020B0604020202020204" pitchFamily="34" charset="0"/>
+              </a:rPr>
+              <a:t> with heart disease.</a:t>
+            </a:r>
+          </a:p>
+          <a:p>
+            <a:pPr marL="457200" marR="0" lvl="1" indent="0" algn="just" defTabSz="914400" rtl="0" eaLnBrk="0" fontAlgn="base" latinLnBrk="0" hangingPunct="0">
+              <a:lnSpc>
+                <a:spcPct val="150000"/>
+              </a:lnSpc>
+              <a:spcBef>
+                <a:spcPct val="0"/>
+              </a:spcBef>
+              <a:spcAft>
+                <a:spcPct val="0"/>
+              </a:spcAft>
+              <a:buClrTx/>
+              <a:buSzTx/>
+              <a:buFontTx/>
+              <a:buChar char="•"/>
+              <a:tabLst/>
+            </a:pPr>
+            <a:r>
+              <a:rPr kumimoji="0" lang="en-US" altLang="en-US" sz="1500" b="0" i="0" u="none" strike="noStrike" cap="none" normalizeH="0" baseline="0">
+                <a:ln>
+                  <a:noFill/>
+                </a:ln>
+                <a:solidFill>
+                  <a:schemeClr val="tx1"/>
+                </a:solidFill>
+                <a:effectLst/>
+                <a:latin typeface="Arial Unicode MS"/>
+              </a:rPr>
+              <a:t>Max heart rate achieved</a:t>
+            </a:r>
+            <a:r>
+              <a:rPr kumimoji="0" lang="en-US" altLang="en-US" sz="1500" b="0" i="0" u="none" strike="noStrike" cap="none" normalizeH="0" baseline="0">
+                <a:ln>
+                  <a:noFill/>
+                </a:ln>
+                <a:solidFill>
+                  <a:schemeClr val="tx1"/>
+                </a:solidFill>
+                <a:effectLst/>
+              </a:rPr>
+              <a:t> shows a </a:t>
+            </a:r>
+            <a:r>
+              <a:rPr kumimoji="0" lang="en-US" altLang="en-US" sz="1500" b="1" i="0" u="none" strike="noStrike" cap="none" normalizeH="0" baseline="0">
+                <a:ln>
+                  <a:noFill/>
+                </a:ln>
+                <a:solidFill>
+                  <a:schemeClr val="tx1"/>
+                </a:solidFill>
+                <a:effectLst/>
+                <a:latin typeface="Arial" panose="020B0604020202020204" pitchFamily="34" charset="0"/>
+              </a:rPr>
+              <a:t>negative correlation (-0.41)</a:t>
+            </a:r>
+            <a:r>
+              <a:rPr kumimoji="0" lang="en-US" altLang="en-US" sz="1500" b="0" i="0" u="none" strike="noStrike" cap="none" normalizeH="0" baseline="0">
+                <a:ln>
+                  <a:noFill/>
+                </a:ln>
+                <a:solidFill>
+                  <a:schemeClr val="tx1"/>
+                </a:solidFill>
+                <a:effectLst/>
+                <a:latin typeface="Arial" panose="020B0604020202020204" pitchFamily="34" charset="0"/>
+              </a:rPr>
+              <a:t> – meaning lower max heart rate is associated with disease.</a:t>
+            </a:r>
+          </a:p>
+          <a:p>
+            <a:pPr marL="0" marR="0" lvl="0" indent="0" algn="l" defTabSz="914400" rtl="0" eaLnBrk="0" fontAlgn="base" latinLnBrk="0" hangingPunct="0">
+              <a:lnSpc>
+                <a:spcPct val="150000"/>
+              </a:lnSpc>
+              <a:spcBef>
+                <a:spcPct val="0"/>
+              </a:spcBef>
+              <a:spcAft>
+                <a:spcPct val="0"/>
+              </a:spcAft>
+              <a:buClrTx/>
+              <a:buSzTx/>
+              <a:buFontTx/>
+              <a:buChar char="•"/>
+              <a:tabLst/>
+            </a:pPr>
+            <a:r>
+              <a:rPr kumimoji="0" lang="en-US" altLang="en-US" sz="1500" b="0" i="0" u="none" strike="noStrike" cap="none" normalizeH="0" baseline="0">
+                <a:ln>
+                  <a:noFill/>
+                </a:ln>
+                <a:solidFill>
+                  <a:schemeClr val="tx1"/>
+                </a:solidFill>
+                <a:effectLst/>
+                <a:latin typeface="Arial" panose="020B0604020202020204" pitchFamily="34" charset="0"/>
+              </a:rPr>
+              <a:t>✅ These insights help prioritize features for model training and feature importance analysis.</a:t>
+            </a:r>
+          </a:p>
+          <a:p>
+            <a:pPr marL="0" marR="0" lvl="0" indent="0" algn="l" defTabSz="914400" rtl="0" eaLnBrk="0" fontAlgn="base" latinLnBrk="0" hangingPunct="0">
+              <a:lnSpc>
+                <a:spcPct val="150000"/>
+              </a:lnSpc>
+              <a:spcBef>
+                <a:spcPct val="0"/>
+              </a:spcBef>
+              <a:spcAft>
+                <a:spcPct val="0"/>
+              </a:spcAft>
+              <a:buClrTx/>
+              <a:buSzTx/>
+              <a:buFontTx/>
+              <a:buNone/>
+              <a:tabLst/>
+            </a:pPr>
+            <a:endParaRPr kumimoji="0" lang="en-US" altLang="en-US" sz="1500" b="0" i="0" u="none" strike="noStrike" cap="none" normalizeH="0" baseline="0">
+              <a:ln>
+                <a:noFill/>
+              </a:ln>
+              <a:solidFill>
+                <a:schemeClr val="tx1"/>
+              </a:solidFill>
+              <a:effectLst/>
+              <a:latin typeface="Arial" panose="020B0604020202020204" pitchFamily="34" charset="0"/>
+            </a:endParaRPr>
+          </a:p>
+        </p:txBody>
+      </p:sp>
+      <p:pic>
+        <p:nvPicPr>
+          <p:cNvPr id="12" name="Content Placeholder 11">
+            <a:extLst>
+              <a:ext uri="{FF2B5EF4-FFF2-40B4-BE49-F238E27FC236}">
+                <a16:creationId xmlns:a16="http://schemas.microsoft.com/office/drawing/2014/main" id="{B7C826A1-D43D-8FF4-AE3B-ABB3F17F3F5D}"/>
+              </a:ext>
+            </a:extLst>
+          </p:cNvPr>
+          <p:cNvPicPr>
+            <a:picLocks noGrp="1" noChangeAspect="1"/>
+          </p:cNvPicPr>
+          <p:nvPr>
+            <p:ph sz="half" idx="2"/>
+          </p:nvPr>
+        </p:nvPicPr>
+        <p:blipFill>
+          <a:blip r:embed="rId2"/>
+          <a:stretch>
+            <a:fillRect/>
+          </a:stretch>
+        </p:blipFill>
+        <p:spPr>
+          <a:xfrm>
+            <a:off x="4166647" y="466788"/>
+            <a:ext cx="4901939" cy="6061051"/>
+          </a:xfrm>
+        </p:spPr>
+      </p:pic>
+    </p:spTree>
+    <p:extLst>
+      <p:ext uri="{BB962C8B-B14F-4D97-AF65-F5344CB8AC3E}">
+        <p14:creationId xmlns:p14="http://schemas.microsoft.com/office/powerpoint/2010/main" val="3027899609"/>
+      </p:ext>
+    </p:extLst>
+  </p:cSld>
+  <p:clrMapOvr>
+    <a:masterClrMapping/>
+  </p:clrMapOvr>
+  <mc:AlternateContent xmlns:mc="http://schemas.openxmlformats.org/markup-compatibility/2006">
+    <mc:Choice xmlns:p14="http://schemas.microsoft.com/office/powerpoint/2010/main" Requires="p14">
+      <p:transition spd="med" p14:dur="700">
+        <p:fade/>
+      </p:transition>
+    </mc:Choice>
+    <mc:Fallback>
+      <p:transition spd="med">
+        <p:fade/>
+      </p:transition>
+    </mc:Fallback>
+  </mc:AlternateContent>
+</p:sld>
+</file>
+
+<file path=ppt/slides/slide7.xml><?xml version="1.0" encoding="utf-8"?>
+<p:sld xmlns:a="http://schemas.openxmlformats.org/drawingml/2006/main" xmlns:r="http://schemas.openxmlformats.org/officeDocument/2006/relationships" xmlns:p="http://schemas.openxmlformats.org/presentationml/2006/main">
+  <p:cSld>
+    <p:spTree>
+      <p:nvGrpSpPr>
+        <p:cNvPr id="1" name=""/>
+        <p:cNvGrpSpPr/>
+        <p:nvPr/>
+      </p:nvGrpSpPr>
+      <p:grpSpPr>
+        <a:xfrm>
+          <a:off x="0" y="0"/>
+          <a:ext cx="0" cy="0"/>
+          <a:chOff x="0" y="0"/>
+          <a:chExt cx="0" cy="0"/>
+        </a:xfrm>
+      </p:grpSpPr>
       <p:sp>
         <p:nvSpPr>
           <p:cNvPr id="2" name="Title 1"/>
@@ -3596,7 +4919,7 @@
           <a:lstStyle/>
           <a:p>
             <a:r>
-              <a:t>Conclusion</a:t>
+              <a:t>Model Training</a:t>
             </a:r>
           </a:p>
         </p:txBody>
@@ -3616,18 +4939,27 @@
           <a:bodyPr/>
           <a:lstStyle/>
           <a:p>
-            <a:r>
-              <a:t>• Built a robust model to assist in heart disease detection.</a:t>
-            </a:r>
-          </a:p>
-          <a:p>
-            <a:r>
-              <a:t>• Can be integrated into clinical decision systems.</a:t>
-            </a:r>
-          </a:p>
-          <a:p>
-            <a:r>
-              <a:t>• Scope for improvement: More data, ensemble models, real-time deployment.</a:t>
+            <a:pPr marL="0" indent="0">
+              <a:buNone/>
+            </a:pPr>
+            <a:r>
+              <a:t>• Used Random Forest Classifier.</a:t>
+            </a:r>
+          </a:p>
+          <a:p>
+            <a:pPr marL="0" indent="0">
+              <a:buNone/>
+            </a:pPr>
+            <a:r>
+              <a:t>• Trained the model on 80% of the data.</a:t>
+            </a:r>
+          </a:p>
+          <a:p>
+            <a:pPr marL="0" indent="0">
+              <a:buNone/>
+            </a:pPr>
+            <a:r>
+              <a:t>• Performed predictions on test set.</a:t>
             </a:r>
           </a:p>
         </p:txBody>
@@ -3637,6 +4969,824 @@
   <p:clrMapOvr>
     <a:masterClrMapping/>
   </p:clrMapOvr>
+  <mc:AlternateContent xmlns:mc="http://schemas.openxmlformats.org/markup-compatibility/2006">
+    <mc:Choice xmlns:p14="http://schemas.microsoft.com/office/powerpoint/2010/main" Requires="p14">
+      <p:transition spd="med" p14:dur="700">
+        <p:fade/>
+      </p:transition>
+    </mc:Choice>
+    <mc:Fallback>
+      <p:transition spd="med">
+        <p:fade/>
+      </p:transition>
+    </mc:Fallback>
+  </mc:AlternateContent>
+</p:sld>
+</file>
+
+<file path=ppt/slides/slide8.xml><?xml version="1.0" encoding="utf-8"?>
+<p:sld xmlns:a="http://schemas.openxmlformats.org/drawingml/2006/main" xmlns:r="http://schemas.openxmlformats.org/officeDocument/2006/relationships" xmlns:p="http://schemas.openxmlformats.org/presentationml/2006/main">
+  <p:cSld>
+    <p:spTree>
+      <p:nvGrpSpPr>
+        <p:cNvPr id="1" name=""/>
+        <p:cNvGrpSpPr/>
+        <p:nvPr/>
+      </p:nvGrpSpPr>
+      <p:grpSpPr>
+        <a:xfrm>
+          <a:off x="0" y="0"/>
+          <a:ext cx="0" cy="0"/>
+          <a:chOff x="0" y="0"/>
+          <a:chExt cx="0" cy="0"/>
+        </a:xfrm>
+      </p:grpSpPr>
+      <p:sp>
+        <p:nvSpPr>
+          <p:cNvPr id="2" name="Title 1"/>
+          <p:cNvSpPr>
+            <a:spLocks noGrp="1"/>
+          </p:cNvSpPr>
+          <p:nvPr>
+            <p:ph type="title"/>
+          </p:nvPr>
+        </p:nvSpPr>
+        <p:spPr/>
+        <p:txBody>
+          <a:bodyPr/>
+          <a:lstStyle/>
+          <a:p>
+            <a:r>
+              <a:t>Model Evaluation</a:t>
+            </a:r>
+          </a:p>
+        </p:txBody>
+      </p:sp>
+      <p:sp>
+        <p:nvSpPr>
+          <p:cNvPr id="3" name="Content Placeholder 2"/>
+          <p:cNvSpPr>
+            <a:spLocks noGrp="1"/>
+          </p:cNvSpPr>
+          <p:nvPr>
+            <p:ph idx="1"/>
+          </p:nvPr>
+        </p:nvSpPr>
+        <p:spPr/>
+        <p:txBody>
+          <a:bodyPr/>
+          <a:lstStyle/>
+          <a:p>
+            <a:pPr marL="0" indent="0">
+              <a:buNone/>
+            </a:pPr>
+            <a:r>
+              <a:t>• Accuracy: ~85%-90%.</a:t>
+            </a:r>
+          </a:p>
+          <a:p>
+            <a:pPr marL="0" indent="0">
+              <a:buNone/>
+            </a:pPr>
+            <a:r>
+              <a:t>• Confusion Matrix: Good balance of TP and TN.</a:t>
+            </a:r>
+          </a:p>
+          <a:p>
+            <a:pPr marL="0" indent="0">
+              <a:buNone/>
+            </a:pPr>
+            <a:r>
+              <a:t>• Precision, Recall, and F1 Score reported from classification report.</a:t>
+            </a:r>
+          </a:p>
+        </p:txBody>
+      </p:sp>
+    </p:spTree>
+  </p:cSld>
+  <p:clrMapOvr>
+    <a:masterClrMapping/>
+  </p:clrMapOvr>
+  <mc:AlternateContent xmlns:mc="http://schemas.openxmlformats.org/markup-compatibility/2006">
+    <mc:Choice xmlns:p14="http://schemas.microsoft.com/office/powerpoint/2010/main" Requires="p14">
+      <p:transition spd="med" p14:dur="700">
+        <p:fade/>
+      </p:transition>
+    </mc:Choice>
+    <mc:Fallback>
+      <p:transition spd="med">
+        <p:fade/>
+      </p:transition>
+    </mc:Fallback>
+  </mc:AlternateContent>
+</p:sld>
+</file>
+
+<file path=ppt/slides/slide9.xml><?xml version="1.0" encoding="utf-8"?>
+<p:sld xmlns:a="http://schemas.openxmlformats.org/drawingml/2006/main" xmlns:r="http://schemas.openxmlformats.org/officeDocument/2006/relationships" xmlns:p="http://schemas.openxmlformats.org/presentationml/2006/main">
+  <p:cSld>
+    <p:spTree>
+      <p:nvGrpSpPr>
+        <p:cNvPr id="1" name=""/>
+        <p:cNvGrpSpPr/>
+        <p:nvPr/>
+      </p:nvGrpSpPr>
+      <p:grpSpPr>
+        <a:xfrm>
+          <a:off x="0" y="0"/>
+          <a:ext cx="0" cy="0"/>
+          <a:chOff x="0" y="0"/>
+          <a:chExt cx="0" cy="0"/>
+        </a:xfrm>
+      </p:grpSpPr>
+      <p:pic>
+        <p:nvPicPr>
+          <p:cNvPr id="5" name="Content Placeholder 4">
+            <a:extLst>
+              <a:ext uri="{FF2B5EF4-FFF2-40B4-BE49-F238E27FC236}">
+                <a16:creationId xmlns:a16="http://schemas.microsoft.com/office/drawing/2014/main" id="{3F255DDA-53CA-2702-54CC-5F3148003742}"/>
+              </a:ext>
+            </a:extLst>
+          </p:cNvPr>
+          <p:cNvPicPr>
+            <a:picLocks noGrp="1" noChangeAspect="1"/>
+          </p:cNvPicPr>
+          <p:nvPr>
+            <p:ph idx="1"/>
+          </p:nvPr>
+        </p:nvPicPr>
+        <p:blipFill>
+          <a:blip r:embed="rId2"/>
+          <a:stretch>
+            <a:fillRect/>
+          </a:stretch>
+        </p:blipFill>
+        <p:spPr>
+          <a:xfrm>
+            <a:off x="5293169" y="690834"/>
+            <a:ext cx="3850831" cy="3239172"/>
+          </a:xfrm>
+        </p:spPr>
+      </p:pic>
+      <p:sp>
+        <p:nvSpPr>
+          <p:cNvPr id="10" name="Rectangle 1">
+            <a:extLst>
+              <a:ext uri="{FF2B5EF4-FFF2-40B4-BE49-F238E27FC236}">
+                <a16:creationId xmlns:a16="http://schemas.microsoft.com/office/drawing/2014/main" id="{9A5AD9DD-A418-EBAB-E24B-070A6EFD6446}"/>
+              </a:ext>
+            </a:extLst>
+          </p:cNvPr>
+          <p:cNvSpPr>
+            <a:spLocks noGrp="1" noChangeArrowheads="1"/>
+          </p:cNvSpPr>
+          <p:nvPr>
+            <p:ph type="body" sz="half" idx="2"/>
+          </p:nvPr>
+        </p:nvSpPr>
+        <p:spPr bwMode="auto">
+          <a:xfrm>
+            <a:off x="141403" y="361464"/>
+            <a:ext cx="5354424" cy="4408899"/>
+          </a:xfrm>
+          <a:prstGeom prst="rect">
+            <a:avLst/>
+          </a:prstGeom>
+          <a:noFill/>
+          <a:ln>
+            <a:noFill/>
+          </a:ln>
+          <a:effectLst/>
+          <a:extLst>
+            <a:ext uri="{909E8E84-426E-40DD-AFC4-6F175D3DCCD1}">
+              <a14:hiddenFill xmlns:a14="http://schemas.microsoft.com/office/drawing/2010/main">
+                <a:solidFill>
+                  <a:schemeClr val="accent1"/>
+                </a:solidFill>
+              </a14:hiddenFill>
+            </a:ext>
+            <a:ext uri="{91240B29-F687-4F45-9708-019B960494DF}">
+              <a14:hiddenLine xmlns:a14="http://schemas.microsoft.com/office/drawing/2010/main" w="9525">
+                <a:solidFill>
+                  <a:schemeClr val="tx1"/>
+                </a:solidFill>
+                <a:miter lim="800000"/>
+                <a:headEnd/>
+                <a:tailEnd/>
+              </a14:hiddenLine>
+            </a:ext>
+            <a:ext uri="{AF507438-7753-43E0-B8FC-AC1667EBCBE1}">
+              <a14:hiddenEffects xmlns:a14="http://schemas.microsoft.com/office/drawing/2010/main">
+                <a:effectLst>
+                  <a:outerShdw dist="35921" dir="2700000" algn="ctr" rotWithShape="0">
+                    <a:schemeClr val="bg2"/>
+                  </a:outerShdw>
+                </a:effectLst>
+              </a14:hiddenEffects>
+            </a:ext>
+          </a:extLst>
+        </p:spPr>
+        <p:txBody>
+          <a:bodyPr vert="horz" wrap="square" lIns="91440" tIns="45720" rIns="91440" bIns="45720" numCol="1" anchor="ctr" anchorCtr="0" compatLnSpc="1">
+            <a:prstTxWarp prst="textNoShape">
+              <a:avLst/>
+            </a:prstTxWarp>
+            <a:spAutoFit/>
+          </a:bodyPr>
+          <a:lstStyle/>
+          <a:p>
+            <a:pPr algn="just" defTabSz="914400" eaLnBrk="0" fontAlgn="base" hangingPunct="0">
+              <a:spcBef>
+                <a:spcPct val="0"/>
+              </a:spcBef>
+              <a:spcAft>
+                <a:spcPct val="0"/>
+              </a:spcAft>
+            </a:pPr>
+            <a:r>
+              <a:rPr kumimoji="0" lang="en-US" altLang="en-US" sz="1500" b="1" i="0" u="none" strike="noStrike" cap="none" normalizeH="0" baseline="0">
+                <a:ln>
+                  <a:noFill/>
+                </a:ln>
+                <a:solidFill>
+                  <a:schemeClr val="tx1"/>
+                </a:solidFill>
+                <a:effectLst/>
+                <a:latin typeface="Arial" panose="020B0604020202020204" pitchFamily="34" charset="0"/>
+              </a:rPr>
+              <a:t>Confusion Matrix – Model Performance</a:t>
+            </a:r>
+            <a:endParaRPr kumimoji="0" lang="en-US" altLang="en-US" sz="1500" b="0" i="0" u="none" strike="noStrike" cap="none" normalizeH="0" baseline="0">
+              <a:ln>
+                <a:noFill/>
+              </a:ln>
+              <a:solidFill>
+                <a:schemeClr val="tx1"/>
+              </a:solidFill>
+              <a:effectLst/>
+            </a:endParaRPr>
+          </a:p>
+          <a:p>
+            <a:pPr algn="just" defTabSz="914400" eaLnBrk="0" fontAlgn="base" hangingPunct="0">
+              <a:lnSpc>
+                <a:spcPct val="150000"/>
+              </a:lnSpc>
+              <a:spcBef>
+                <a:spcPct val="0"/>
+              </a:spcBef>
+              <a:spcAft>
+                <a:spcPct val="0"/>
+              </a:spcAft>
+            </a:pPr>
+            <a:r>
+              <a:rPr kumimoji="0" lang="en-US" altLang="en-US" sz="1500" b="1" i="0" u="none" strike="noStrike" cap="none" normalizeH="0" baseline="0">
+                <a:ln>
+                  <a:noFill/>
+                </a:ln>
+                <a:solidFill>
+                  <a:schemeClr val="tx1"/>
+                </a:solidFill>
+                <a:effectLst/>
+                <a:latin typeface="Arial" panose="020B0604020202020204" pitchFamily="34" charset="0"/>
+              </a:rPr>
+              <a:t>Explanation:</a:t>
+            </a:r>
+            <a:endParaRPr kumimoji="0" lang="en-US" altLang="en-US" sz="1500" b="0" i="0" u="none" strike="noStrike" cap="none" normalizeH="0" baseline="0">
+              <a:ln>
+                <a:noFill/>
+              </a:ln>
+              <a:solidFill>
+                <a:schemeClr val="tx1"/>
+              </a:solidFill>
+              <a:effectLst/>
+              <a:latin typeface="Arial" panose="020B0604020202020204" pitchFamily="34" charset="0"/>
+            </a:endParaRPr>
+          </a:p>
+          <a:p>
+            <a:pPr algn="just" defTabSz="914400" eaLnBrk="0" fontAlgn="base" hangingPunct="0">
+              <a:lnSpc>
+                <a:spcPct val="150000"/>
+              </a:lnSpc>
+              <a:spcBef>
+                <a:spcPct val="0"/>
+              </a:spcBef>
+              <a:spcAft>
+                <a:spcPct val="0"/>
+              </a:spcAft>
+              <a:buFontTx/>
+              <a:buChar char="•"/>
+            </a:pPr>
+            <a:r>
+              <a:rPr kumimoji="0" lang="en-US" altLang="en-US" sz="1500" b="0" i="0" u="none" strike="noStrike" cap="none" normalizeH="0" baseline="0">
+                <a:ln>
+                  <a:noFill/>
+                </a:ln>
+                <a:solidFill>
+                  <a:schemeClr val="tx1"/>
+                </a:solidFill>
+                <a:effectLst/>
+                <a:latin typeface="Arial" panose="020B0604020202020204" pitchFamily="34" charset="0"/>
+              </a:rPr>
+              <a:t>This matrix evaluates the classification model's prediction results:</a:t>
+            </a:r>
+          </a:p>
+          <a:p>
+            <a:pPr lvl="1" algn="just" defTabSz="914400" eaLnBrk="0" fontAlgn="base" hangingPunct="0">
+              <a:lnSpc>
+                <a:spcPct val="150000"/>
+              </a:lnSpc>
+              <a:spcBef>
+                <a:spcPct val="0"/>
+              </a:spcBef>
+              <a:spcAft>
+                <a:spcPct val="0"/>
+              </a:spcAft>
+              <a:buFontTx/>
+              <a:buChar char="•"/>
+            </a:pPr>
+            <a:r>
+              <a:rPr kumimoji="0" lang="en-US" altLang="en-US" sz="1500" b="1" i="0" u="none" strike="noStrike" cap="none" normalizeH="0" baseline="0">
+                <a:ln>
+                  <a:noFill/>
+                </a:ln>
+                <a:solidFill>
+                  <a:schemeClr val="tx1"/>
+                </a:solidFill>
+                <a:effectLst/>
+                <a:latin typeface="Arial" panose="020B0604020202020204" pitchFamily="34" charset="0"/>
+              </a:rPr>
+              <a:t>True Positives (TP)</a:t>
+            </a:r>
+            <a:r>
+              <a:rPr kumimoji="0" lang="en-US" altLang="en-US" sz="1500" b="0" i="0" u="none" strike="noStrike" cap="none" normalizeH="0" baseline="0">
+                <a:ln>
+                  <a:noFill/>
+                </a:ln>
+                <a:solidFill>
+                  <a:schemeClr val="tx1"/>
+                </a:solidFill>
+                <a:effectLst/>
+                <a:latin typeface="Arial" panose="020B0604020202020204" pitchFamily="34" charset="0"/>
+              </a:rPr>
+              <a:t> = 126 → Model correctly predicted heart disease.</a:t>
+            </a:r>
+          </a:p>
+          <a:p>
+            <a:pPr lvl="1" algn="just" defTabSz="914400" eaLnBrk="0" fontAlgn="base" hangingPunct="0">
+              <a:lnSpc>
+                <a:spcPct val="150000"/>
+              </a:lnSpc>
+              <a:spcBef>
+                <a:spcPct val="0"/>
+              </a:spcBef>
+              <a:spcAft>
+                <a:spcPct val="0"/>
+              </a:spcAft>
+              <a:buFontTx/>
+              <a:buChar char="•"/>
+            </a:pPr>
+            <a:r>
+              <a:rPr kumimoji="0" lang="en-US" altLang="en-US" sz="1500" b="1" i="0" u="none" strike="noStrike" cap="none" normalizeH="0" baseline="0">
+                <a:ln>
+                  <a:noFill/>
+                </a:ln>
+                <a:solidFill>
+                  <a:schemeClr val="tx1"/>
+                </a:solidFill>
+                <a:effectLst/>
+                <a:latin typeface="Arial" panose="020B0604020202020204" pitchFamily="34" charset="0"/>
+              </a:rPr>
+              <a:t>True Negatives (TN)</a:t>
+            </a:r>
+            <a:r>
+              <a:rPr kumimoji="0" lang="en-US" altLang="en-US" sz="1500" b="0" i="0" u="none" strike="noStrike" cap="none" normalizeH="0" baseline="0">
+                <a:ln>
+                  <a:noFill/>
+                </a:ln>
+                <a:solidFill>
+                  <a:schemeClr val="tx1"/>
+                </a:solidFill>
+                <a:effectLst/>
+                <a:latin typeface="Arial" panose="020B0604020202020204" pitchFamily="34" charset="0"/>
+              </a:rPr>
+              <a:t> = 100 → Model correctly predicted no disease.</a:t>
+            </a:r>
+          </a:p>
+          <a:p>
+            <a:pPr lvl="1" algn="just" defTabSz="914400" eaLnBrk="0" fontAlgn="base" hangingPunct="0">
+              <a:lnSpc>
+                <a:spcPct val="150000"/>
+              </a:lnSpc>
+              <a:spcBef>
+                <a:spcPct val="0"/>
+              </a:spcBef>
+              <a:spcAft>
+                <a:spcPct val="0"/>
+              </a:spcAft>
+              <a:buFontTx/>
+              <a:buChar char="•"/>
+            </a:pPr>
+            <a:r>
+              <a:rPr kumimoji="0" lang="en-US" altLang="en-US" sz="1500" b="1" i="0" u="none" strike="noStrike" cap="none" normalizeH="0" baseline="0">
+                <a:ln>
+                  <a:noFill/>
+                </a:ln>
+                <a:solidFill>
+                  <a:schemeClr val="tx1"/>
+                </a:solidFill>
+                <a:effectLst/>
+                <a:latin typeface="Arial" panose="020B0604020202020204" pitchFamily="34" charset="0"/>
+              </a:rPr>
+              <a:t>False Positives (FP)</a:t>
+            </a:r>
+            <a:r>
+              <a:rPr kumimoji="0" lang="en-US" altLang="en-US" sz="1500" b="0" i="0" u="none" strike="noStrike" cap="none" normalizeH="0" baseline="0">
+                <a:ln>
+                  <a:noFill/>
+                </a:ln>
+                <a:solidFill>
+                  <a:schemeClr val="tx1"/>
+                </a:solidFill>
+                <a:effectLst/>
+                <a:latin typeface="Arial" panose="020B0604020202020204" pitchFamily="34" charset="0"/>
+              </a:rPr>
+              <a:t> = 7 → Model incorrectly predicted disease.</a:t>
+            </a:r>
+          </a:p>
+          <a:p>
+            <a:pPr lvl="1" algn="just" defTabSz="914400" eaLnBrk="0" fontAlgn="base" hangingPunct="0">
+              <a:lnSpc>
+                <a:spcPct val="150000"/>
+              </a:lnSpc>
+              <a:spcBef>
+                <a:spcPct val="0"/>
+              </a:spcBef>
+              <a:spcAft>
+                <a:spcPct val="0"/>
+              </a:spcAft>
+              <a:buFontTx/>
+              <a:buChar char="•"/>
+            </a:pPr>
+            <a:r>
+              <a:rPr kumimoji="0" lang="en-US" altLang="en-US" sz="1500" b="1" i="0" u="none" strike="noStrike" cap="none" normalizeH="0" baseline="0">
+                <a:ln>
+                  <a:noFill/>
+                </a:ln>
+                <a:solidFill>
+                  <a:schemeClr val="tx1"/>
+                </a:solidFill>
+                <a:effectLst/>
+                <a:latin typeface="Arial" panose="020B0604020202020204" pitchFamily="34" charset="0"/>
+              </a:rPr>
+              <a:t>False Negatives (FN)</a:t>
+            </a:r>
+            <a:r>
+              <a:rPr kumimoji="0" lang="en-US" altLang="en-US" sz="1500" b="0" i="0" u="none" strike="noStrike" cap="none" normalizeH="0" baseline="0">
+                <a:ln>
+                  <a:noFill/>
+                </a:ln>
+                <a:solidFill>
+                  <a:schemeClr val="tx1"/>
+                </a:solidFill>
+                <a:effectLst/>
+                <a:latin typeface="Arial" panose="020B0604020202020204" pitchFamily="34" charset="0"/>
+              </a:rPr>
+              <a:t> = 5 → Model missed actual disease cases.</a:t>
+            </a:r>
+          </a:p>
+          <a:p>
+            <a:pPr marL="0" marR="0" lvl="0" indent="0" algn="l" defTabSz="914400" rtl="0" eaLnBrk="0" fontAlgn="base" latinLnBrk="0" hangingPunct="0">
+              <a:lnSpc>
+                <a:spcPct val="100000"/>
+              </a:lnSpc>
+              <a:spcBef>
+                <a:spcPct val="0"/>
+              </a:spcBef>
+              <a:spcAft>
+                <a:spcPct val="0"/>
+              </a:spcAft>
+              <a:buClrTx/>
+              <a:buSzTx/>
+              <a:buFontTx/>
+              <a:buNone/>
+              <a:tabLst/>
+            </a:pPr>
+            <a:endParaRPr kumimoji="0" lang="en-US" altLang="en-US" sz="1800" b="0" i="0" u="none" strike="noStrike" cap="none" normalizeH="0" baseline="0">
+              <a:ln>
+                <a:noFill/>
+              </a:ln>
+              <a:solidFill>
+                <a:schemeClr val="tx1"/>
+              </a:solidFill>
+              <a:effectLst/>
+              <a:latin typeface="Arial" panose="020B0604020202020204" pitchFamily="34" charset="0"/>
+            </a:endParaRPr>
+          </a:p>
+        </p:txBody>
+      </p:sp>
+      <p:sp>
+        <p:nvSpPr>
+          <p:cNvPr id="13" name="Rectangle 2">
+            <a:extLst>
+              <a:ext uri="{FF2B5EF4-FFF2-40B4-BE49-F238E27FC236}">
+                <a16:creationId xmlns:a16="http://schemas.microsoft.com/office/drawing/2014/main" id="{110148E0-E597-20D1-4B3C-9719571725C3}"/>
+              </a:ext>
+            </a:extLst>
+          </p:cNvPr>
+          <p:cNvSpPr>
+            <a:spLocks noChangeArrowheads="1"/>
+          </p:cNvSpPr>
+          <p:nvPr/>
+        </p:nvSpPr>
+        <p:spPr bwMode="auto">
+          <a:xfrm>
+            <a:off x="141403" y="4547580"/>
+            <a:ext cx="8861194" cy="1841530"/>
+          </a:xfrm>
+          <a:prstGeom prst="rect">
+            <a:avLst/>
+          </a:prstGeom>
+          <a:noFill/>
+          <a:ln>
+            <a:noFill/>
+          </a:ln>
+          <a:effectLst/>
+          <a:extLst>
+            <a:ext uri="{909E8E84-426E-40DD-AFC4-6F175D3DCCD1}">
+              <a14:hiddenFill xmlns:a14="http://schemas.microsoft.com/office/drawing/2010/main">
+                <a:solidFill>
+                  <a:schemeClr val="accent1"/>
+                </a:solidFill>
+              </a14:hiddenFill>
+            </a:ext>
+            <a:ext uri="{91240B29-F687-4F45-9708-019B960494DF}">
+              <a14:hiddenLine xmlns:a14="http://schemas.microsoft.com/office/drawing/2010/main" w="9525">
+                <a:solidFill>
+                  <a:schemeClr val="tx1"/>
+                </a:solidFill>
+                <a:miter lim="800000"/>
+                <a:headEnd/>
+                <a:tailEnd/>
+              </a14:hiddenLine>
+            </a:ext>
+            <a:ext uri="{AF507438-7753-43E0-B8FC-AC1667EBCBE1}">
+              <a14:hiddenEffects xmlns:a14="http://schemas.microsoft.com/office/drawing/2010/main">
+                <a:effectLst>
+                  <a:outerShdw dist="35921" dir="2700000" algn="ctr" rotWithShape="0">
+                    <a:schemeClr val="bg2"/>
+                  </a:outerShdw>
+                </a:effectLst>
+              </a14:hiddenEffects>
+            </a:ext>
+          </a:extLst>
+        </p:spPr>
+        <p:txBody>
+          <a:bodyPr vert="horz" wrap="square" lIns="91440" tIns="45720" rIns="91440" bIns="45720" numCol="1" anchor="ctr" anchorCtr="0" compatLnSpc="1">
+            <a:prstTxWarp prst="textNoShape">
+              <a:avLst/>
+            </a:prstTxWarp>
+            <a:spAutoFit/>
+          </a:bodyPr>
+          <a:lstStyle/>
+          <a:p>
+            <a:pPr marL="0" marR="0" lvl="0" indent="0" algn="l" defTabSz="914400" rtl="0" eaLnBrk="0" fontAlgn="base" latinLnBrk="0" hangingPunct="0">
+              <a:lnSpc>
+                <a:spcPct val="150000"/>
+              </a:lnSpc>
+              <a:spcBef>
+                <a:spcPct val="0"/>
+              </a:spcBef>
+              <a:spcAft>
+                <a:spcPct val="0"/>
+              </a:spcAft>
+              <a:buClrTx/>
+              <a:buSzTx/>
+              <a:buFontTx/>
+              <a:buChar char="•"/>
+              <a:tabLst/>
+            </a:pPr>
+            <a:r>
+              <a:rPr kumimoji="0" lang="en-US" altLang="en-US" sz="1500" b="0" i="0" u="none" strike="noStrike" cap="none" normalizeH="0" baseline="0">
+                <a:ln>
+                  <a:noFill/>
+                </a:ln>
+                <a:solidFill>
+                  <a:schemeClr val="tx1"/>
+                </a:solidFill>
+                <a:effectLst/>
+                <a:latin typeface="Arial" panose="020B0604020202020204" pitchFamily="34" charset="0"/>
+              </a:rPr>
+              <a:t>✅ The model performs very well:</a:t>
+            </a:r>
+          </a:p>
+          <a:p>
+            <a:pPr marL="0" marR="0" lvl="0" indent="0" algn="l" defTabSz="914400" rtl="0" eaLnBrk="0" fontAlgn="base" latinLnBrk="0" hangingPunct="0">
+              <a:lnSpc>
+                <a:spcPct val="150000"/>
+              </a:lnSpc>
+              <a:spcBef>
+                <a:spcPct val="0"/>
+              </a:spcBef>
+              <a:spcAft>
+                <a:spcPct val="0"/>
+              </a:spcAft>
+              <a:buClrTx/>
+              <a:buSzTx/>
+              <a:buFontTx/>
+              <a:buChar char="•"/>
+              <a:tabLst/>
+            </a:pPr>
+            <a:r>
+              <a:rPr kumimoji="0" lang="en-US" altLang="en-US" sz="1500" b="0" i="0" u="none" strike="noStrike" cap="none" normalizeH="0" baseline="0">
+                <a:ln>
+                  <a:noFill/>
+                </a:ln>
+                <a:solidFill>
+                  <a:schemeClr val="tx1"/>
+                </a:solidFill>
+                <a:effectLst/>
+                <a:latin typeface="Arial" panose="020B0604020202020204" pitchFamily="34" charset="0"/>
+              </a:rPr>
+              <a:t>Low false negatives (very important in medical predictions).</a:t>
+            </a:r>
+          </a:p>
+          <a:p>
+            <a:pPr marL="0" marR="0" lvl="0" indent="0" algn="l" defTabSz="914400" rtl="0" eaLnBrk="0" fontAlgn="base" latinLnBrk="0" hangingPunct="0">
+              <a:lnSpc>
+                <a:spcPct val="150000"/>
+              </a:lnSpc>
+              <a:spcBef>
+                <a:spcPct val="0"/>
+              </a:spcBef>
+              <a:spcAft>
+                <a:spcPct val="0"/>
+              </a:spcAft>
+              <a:buClrTx/>
+              <a:buSzTx/>
+              <a:buFontTx/>
+              <a:buChar char="•"/>
+              <a:tabLst/>
+            </a:pPr>
+            <a:r>
+              <a:rPr kumimoji="0" lang="en-US" altLang="en-US" sz="1500" b="0" i="0" u="none" strike="noStrike" cap="none" normalizeH="0" baseline="0">
+                <a:ln>
+                  <a:noFill/>
+                </a:ln>
+                <a:solidFill>
+                  <a:schemeClr val="tx1"/>
+                </a:solidFill>
+                <a:effectLst/>
+                <a:latin typeface="Arial" panose="020B0604020202020204" pitchFamily="34" charset="0"/>
+              </a:rPr>
+              <a:t>Indicates </a:t>
+            </a:r>
+            <a:r>
+              <a:rPr kumimoji="0" lang="en-US" altLang="en-US" sz="1500" b="1" i="0" u="none" strike="noStrike" cap="none" normalizeH="0" baseline="0">
+                <a:ln>
+                  <a:noFill/>
+                </a:ln>
+                <a:solidFill>
+                  <a:schemeClr val="tx1"/>
+                </a:solidFill>
+                <a:effectLst/>
+                <a:latin typeface="Arial" panose="020B0604020202020204" pitchFamily="34" charset="0"/>
+              </a:rPr>
+              <a:t>high recall and precision</a:t>
+            </a:r>
+            <a:r>
+              <a:rPr kumimoji="0" lang="en-US" altLang="en-US" sz="1500" b="0" i="0" u="none" strike="noStrike" cap="none" normalizeH="0" baseline="0">
+                <a:ln>
+                  <a:noFill/>
+                </a:ln>
+                <a:solidFill>
+                  <a:schemeClr val="tx1"/>
+                </a:solidFill>
+                <a:effectLst/>
+                <a:latin typeface="Arial" panose="020B0604020202020204" pitchFamily="34" charset="0"/>
+              </a:rPr>
+              <a:t> for both classes.</a:t>
+            </a:r>
+          </a:p>
+          <a:p>
+            <a:pPr marL="0" marR="0" lvl="0" indent="0" algn="l" defTabSz="914400" rtl="0" eaLnBrk="0" fontAlgn="base" latinLnBrk="0" hangingPunct="0">
+              <a:lnSpc>
+                <a:spcPct val="150000"/>
+              </a:lnSpc>
+              <a:spcBef>
+                <a:spcPct val="0"/>
+              </a:spcBef>
+              <a:spcAft>
+                <a:spcPct val="0"/>
+              </a:spcAft>
+              <a:buClrTx/>
+              <a:buSzTx/>
+              <a:buFontTx/>
+              <a:buChar char="•"/>
+              <a:tabLst/>
+            </a:pPr>
+            <a:r>
+              <a:rPr kumimoji="0" lang="en-US" altLang="en-US" sz="1500" b="0" i="0" u="none" strike="noStrike" cap="none" normalizeH="0" baseline="0">
+                <a:ln>
+                  <a:noFill/>
+                </a:ln>
+                <a:solidFill>
+                  <a:schemeClr val="tx1"/>
+                </a:solidFill>
+                <a:effectLst/>
+                <a:latin typeface="Arial" panose="020B0604020202020204" pitchFamily="34" charset="0"/>
+              </a:rPr>
+              <a:t>🧠 </a:t>
+            </a:r>
+            <a:r>
+              <a:rPr kumimoji="0" lang="en-US" altLang="en-US" sz="1500" b="0" i="1" u="none" strike="noStrike" cap="none" normalizeH="0" baseline="0">
+                <a:ln>
+                  <a:noFill/>
+                </a:ln>
+                <a:solidFill>
+                  <a:schemeClr val="tx1"/>
+                </a:solidFill>
+                <a:effectLst/>
+                <a:latin typeface="Arial" panose="020B0604020202020204" pitchFamily="34" charset="0"/>
+              </a:rPr>
+              <a:t>Why this matters:</a:t>
+            </a:r>
+            <a:r>
+              <a:rPr kumimoji="0" lang="en-US" altLang="en-US" sz="1500" b="0" i="0" u="none" strike="noStrike" cap="none" normalizeH="0" baseline="0">
+                <a:ln>
+                  <a:noFill/>
+                </a:ln>
+                <a:solidFill>
+                  <a:schemeClr val="tx1"/>
+                </a:solidFill>
+                <a:effectLst/>
+                <a:latin typeface="Arial" panose="020B0604020202020204" pitchFamily="34" charset="0"/>
+              </a:rPr>
+              <a:t> In healthcare, </a:t>
+            </a:r>
+            <a:r>
+              <a:rPr kumimoji="0" lang="en-US" altLang="en-US" sz="1500" b="1" i="0" u="none" strike="noStrike" cap="none" normalizeH="0" baseline="0">
+                <a:ln>
+                  <a:noFill/>
+                </a:ln>
+                <a:solidFill>
+                  <a:schemeClr val="tx1"/>
+                </a:solidFill>
+                <a:effectLst/>
+                <a:latin typeface="Arial" panose="020B0604020202020204" pitchFamily="34" charset="0"/>
+              </a:rPr>
+              <a:t>minimizing false negatives</a:t>
+            </a:r>
+            <a:r>
+              <a:rPr kumimoji="0" lang="en-US" altLang="en-US" sz="1500" b="0" i="0" u="none" strike="noStrike" cap="none" normalizeH="0" baseline="0">
+                <a:ln>
+                  <a:noFill/>
+                </a:ln>
+                <a:solidFill>
+                  <a:schemeClr val="tx1"/>
+                </a:solidFill>
+                <a:effectLst/>
+                <a:latin typeface="Arial" panose="020B0604020202020204" pitchFamily="34" charset="0"/>
+              </a:rPr>
+              <a:t> is critical, because missing a real heart disease case can be fatal</a:t>
+            </a:r>
+            <a:r>
+              <a:rPr kumimoji="0" lang="en-US" altLang="en-US" sz="1800" b="0" i="0" u="none" strike="noStrike" cap="none" normalizeH="0" baseline="0">
+                <a:ln>
+                  <a:noFill/>
+                </a:ln>
+                <a:solidFill>
+                  <a:schemeClr val="tx1"/>
+                </a:solidFill>
+                <a:effectLst/>
+                <a:latin typeface="Arial" panose="020B0604020202020204" pitchFamily="34" charset="0"/>
+              </a:rPr>
+              <a:t>.</a:t>
+            </a:r>
+          </a:p>
+        </p:txBody>
+      </p:sp>
+    </p:spTree>
+    <p:extLst>
+      <p:ext uri="{BB962C8B-B14F-4D97-AF65-F5344CB8AC3E}">
+        <p14:creationId xmlns:p14="http://schemas.microsoft.com/office/powerpoint/2010/main" val="4030933945"/>
+      </p:ext>
+    </p:extLst>
+  </p:cSld>
+  <p:clrMapOvr>
+    <a:masterClrMapping/>
+  </p:clrMapOvr>
+  <mc:AlternateContent xmlns:mc="http://schemas.openxmlformats.org/markup-compatibility/2006">
+    <mc:Choice xmlns:p14="http://schemas.microsoft.com/office/powerpoint/2010/main" Requires="p14">
+      <p:transition spd="med" p14:dur="700">
+        <p:fade/>
+      </p:transition>
+    </mc:Choice>
+    <mc:Fallback>
+      <p:transition spd="med">
+        <p:fade/>
+      </p:transition>
+    </mc:Fallback>
+  </mc:AlternateContent>
 </p:sld>
 </file>
 

</xml_diff>